<commit_message>
Manutenção no artefato 15
</commit_message>
<xml_diff>
--- a/15. Arquitetura de Negócio Para Cada Cenário.pptx
+++ b/15. Arquitetura de Negócio Para Cada Cenário.pptx
@@ -133,7 +133,7 @@
           <p:cNvPr id="2" name="Título 1">
             <a:extLst>
               <a:ext uri="{FF2B5EF4-FFF2-40B4-BE49-F238E27FC236}">
-                <a16:creationId xmlns:a16="http://schemas.microsoft.com/office/drawing/2014/main" id="{0528499D-6B1D-4D46-8837-CC1EF4BD7330}"/>
+                <a16:creationId xmlns:a16="http://schemas.microsoft.com/office/drawing/2014/main" id="{1BE3395A-9EB6-4AFB-AE4F-75CFD80B0FC3}"/>
               </a:ext>
             </a:extLst>
           </p:cNvPr>
@@ -170,7 +170,7 @@
           <p:cNvPr id="3" name="Subtítulo 2">
             <a:extLst>
               <a:ext uri="{FF2B5EF4-FFF2-40B4-BE49-F238E27FC236}">
-                <a16:creationId xmlns:a16="http://schemas.microsoft.com/office/drawing/2014/main" id="{5C5B4DCF-B095-4366-986D-3DA8711133A7}"/>
+                <a16:creationId xmlns:a16="http://schemas.microsoft.com/office/drawing/2014/main" id="{152B6745-F117-4F0A-8807-CC09AFBB374D}"/>
               </a:ext>
             </a:extLst>
           </p:cNvPr>
@@ -240,7 +240,7 @@
           <p:cNvPr id="4" name="Espaço Reservado para Data 3">
             <a:extLst>
               <a:ext uri="{FF2B5EF4-FFF2-40B4-BE49-F238E27FC236}">
-                <a16:creationId xmlns:a16="http://schemas.microsoft.com/office/drawing/2014/main" id="{72986B09-D60C-49B4-A59F-21675EB42949}"/>
+                <a16:creationId xmlns:a16="http://schemas.microsoft.com/office/drawing/2014/main" id="{BDF388F5-02F2-4C85-BBE9-E4230B97C77D}"/>
               </a:ext>
             </a:extLst>
           </p:cNvPr>
@@ -256,9 +256,9 @@
           <a:bodyPr/>
           <a:lstStyle/>
           <a:p>
-            <a:fld id="{3373EF41-AD06-4E54-890B-37060B951729}" type="datetimeFigureOut">
+            <a:fld id="{1A3BC42B-6901-4EDA-813C-5D3930327F95}" type="datetimeFigureOut">
               <a:rPr lang="pt-BR" smtClean="0"/>
-              <a:t>25/02/2021</a:t>
+              <a:t>08/03/2021</a:t>
             </a:fld>
             <a:endParaRPr lang="pt-BR"/>
           </a:p>
@@ -269,7 +269,7 @@
           <p:cNvPr id="5" name="Espaço Reservado para Rodapé 4">
             <a:extLst>
               <a:ext uri="{FF2B5EF4-FFF2-40B4-BE49-F238E27FC236}">
-                <a16:creationId xmlns:a16="http://schemas.microsoft.com/office/drawing/2014/main" id="{22B28A3A-D57C-4A91-90B8-E309A8259B1B}"/>
+                <a16:creationId xmlns:a16="http://schemas.microsoft.com/office/drawing/2014/main" id="{5F2EA5FF-52E9-4EF0-9B32-EC65CF3BDC49}"/>
               </a:ext>
             </a:extLst>
           </p:cNvPr>
@@ -294,7 +294,7 @@
           <p:cNvPr id="6" name="Espaço Reservado para Número de Slide 5">
             <a:extLst>
               <a:ext uri="{FF2B5EF4-FFF2-40B4-BE49-F238E27FC236}">
-                <a16:creationId xmlns:a16="http://schemas.microsoft.com/office/drawing/2014/main" id="{814964F9-795F-4A6C-B15C-C1F3D0456E48}"/>
+                <a16:creationId xmlns:a16="http://schemas.microsoft.com/office/drawing/2014/main" id="{88C1E677-E9C6-494C-840B-B37178771646}"/>
               </a:ext>
             </a:extLst>
           </p:cNvPr>
@@ -310,7 +310,7 @@
           <a:bodyPr/>
           <a:lstStyle/>
           <a:p>
-            <a:fld id="{2C91DB90-DE66-4410-B55F-29C463C8C502}" type="slidenum">
+            <a:fld id="{036ABD3C-081F-4627-9F47-A2982928E032}" type="slidenum">
               <a:rPr lang="pt-BR" smtClean="0"/>
               <a:t>‹nº›</a:t>
             </a:fld>
@@ -321,7 +321,7 @@
     </p:spTree>
     <p:extLst>
       <p:ext uri="{BB962C8B-B14F-4D97-AF65-F5344CB8AC3E}">
-        <p14:creationId xmlns:p14="http://schemas.microsoft.com/office/powerpoint/2010/main" val="3297413475"/>
+        <p14:creationId xmlns:p14="http://schemas.microsoft.com/office/powerpoint/2010/main" val="539442940"/>
       </p:ext>
     </p:extLst>
   </p:cSld>
@@ -353,7 +353,7 @@
           <p:cNvPr id="2" name="Título 1">
             <a:extLst>
               <a:ext uri="{FF2B5EF4-FFF2-40B4-BE49-F238E27FC236}">
-                <a16:creationId xmlns:a16="http://schemas.microsoft.com/office/drawing/2014/main" id="{87C3106D-4D24-4CC5-888E-1F6028B67422}"/>
+                <a16:creationId xmlns:a16="http://schemas.microsoft.com/office/drawing/2014/main" id="{C8FD82C4-C40A-4C61-A71A-BC11EF2F7CFD}"/>
               </a:ext>
             </a:extLst>
           </p:cNvPr>
@@ -381,7 +381,7 @@
           <p:cNvPr id="3" name="Espaço Reservado para Texto Vertical 2">
             <a:extLst>
               <a:ext uri="{FF2B5EF4-FFF2-40B4-BE49-F238E27FC236}">
-                <a16:creationId xmlns:a16="http://schemas.microsoft.com/office/drawing/2014/main" id="{97AFE971-6237-4440-AFD1-F8083228CC88}"/>
+                <a16:creationId xmlns:a16="http://schemas.microsoft.com/office/drawing/2014/main" id="{5BF97C0E-365A-48D6-B02B-9630EAD7992B}"/>
               </a:ext>
             </a:extLst>
           </p:cNvPr>
@@ -438,7 +438,7 @@
           <p:cNvPr id="4" name="Espaço Reservado para Data 3">
             <a:extLst>
               <a:ext uri="{FF2B5EF4-FFF2-40B4-BE49-F238E27FC236}">
-                <a16:creationId xmlns:a16="http://schemas.microsoft.com/office/drawing/2014/main" id="{D85A936E-2114-4D55-8CD0-60CC84F474A2}"/>
+                <a16:creationId xmlns:a16="http://schemas.microsoft.com/office/drawing/2014/main" id="{340CB429-8CB8-4FF7-B9AD-2E4092707B27}"/>
               </a:ext>
             </a:extLst>
           </p:cNvPr>
@@ -454,9 +454,9 @@
           <a:bodyPr/>
           <a:lstStyle/>
           <a:p>
-            <a:fld id="{3373EF41-AD06-4E54-890B-37060B951729}" type="datetimeFigureOut">
+            <a:fld id="{1A3BC42B-6901-4EDA-813C-5D3930327F95}" type="datetimeFigureOut">
               <a:rPr lang="pt-BR" smtClean="0"/>
-              <a:t>25/02/2021</a:t>
+              <a:t>08/03/2021</a:t>
             </a:fld>
             <a:endParaRPr lang="pt-BR"/>
           </a:p>
@@ -467,7 +467,7 @@
           <p:cNvPr id="5" name="Espaço Reservado para Rodapé 4">
             <a:extLst>
               <a:ext uri="{FF2B5EF4-FFF2-40B4-BE49-F238E27FC236}">
-                <a16:creationId xmlns:a16="http://schemas.microsoft.com/office/drawing/2014/main" id="{A1D32991-1958-4233-87C4-FF829A722B57}"/>
+                <a16:creationId xmlns:a16="http://schemas.microsoft.com/office/drawing/2014/main" id="{DBAD5157-C655-4491-B8E8-FB30766F8061}"/>
               </a:ext>
             </a:extLst>
           </p:cNvPr>
@@ -492,7 +492,7 @@
           <p:cNvPr id="6" name="Espaço Reservado para Número de Slide 5">
             <a:extLst>
               <a:ext uri="{FF2B5EF4-FFF2-40B4-BE49-F238E27FC236}">
-                <a16:creationId xmlns:a16="http://schemas.microsoft.com/office/drawing/2014/main" id="{44E8C0A0-461B-40A7-872E-72A68BA7F42D}"/>
+                <a16:creationId xmlns:a16="http://schemas.microsoft.com/office/drawing/2014/main" id="{1E84009B-6554-4EE9-B4DF-1E46AAC06C04}"/>
               </a:ext>
             </a:extLst>
           </p:cNvPr>
@@ -508,7 +508,7 @@
           <a:bodyPr/>
           <a:lstStyle/>
           <a:p>
-            <a:fld id="{2C91DB90-DE66-4410-B55F-29C463C8C502}" type="slidenum">
+            <a:fld id="{036ABD3C-081F-4627-9F47-A2982928E032}" type="slidenum">
               <a:rPr lang="pt-BR" smtClean="0"/>
               <a:t>‹nº›</a:t>
             </a:fld>
@@ -519,7 +519,7 @@
     </p:spTree>
     <p:extLst>
       <p:ext uri="{BB962C8B-B14F-4D97-AF65-F5344CB8AC3E}">
-        <p14:creationId xmlns:p14="http://schemas.microsoft.com/office/powerpoint/2010/main" val="2801263942"/>
+        <p14:creationId xmlns:p14="http://schemas.microsoft.com/office/powerpoint/2010/main" val="3621492807"/>
       </p:ext>
     </p:extLst>
   </p:cSld>
@@ -551,7 +551,7 @@
           <p:cNvPr id="2" name="Título Vertical 1">
             <a:extLst>
               <a:ext uri="{FF2B5EF4-FFF2-40B4-BE49-F238E27FC236}">
-                <a16:creationId xmlns:a16="http://schemas.microsoft.com/office/drawing/2014/main" id="{121BDCFA-BB78-4027-A471-7A35BE1A7BB6}"/>
+                <a16:creationId xmlns:a16="http://schemas.microsoft.com/office/drawing/2014/main" id="{1C5A4450-5739-4D71-AABB-6E1C801AB7B8}"/>
               </a:ext>
             </a:extLst>
           </p:cNvPr>
@@ -584,7 +584,7 @@
           <p:cNvPr id="3" name="Espaço Reservado para Texto Vertical 2">
             <a:extLst>
               <a:ext uri="{FF2B5EF4-FFF2-40B4-BE49-F238E27FC236}">
-                <a16:creationId xmlns:a16="http://schemas.microsoft.com/office/drawing/2014/main" id="{7E981FEB-3A1A-41AE-BF64-36CC90441EC2}"/>
+                <a16:creationId xmlns:a16="http://schemas.microsoft.com/office/drawing/2014/main" id="{E6DBBE05-AAC7-4141-88F8-C45B64D66E80}"/>
               </a:ext>
             </a:extLst>
           </p:cNvPr>
@@ -646,7 +646,7 @@
           <p:cNvPr id="4" name="Espaço Reservado para Data 3">
             <a:extLst>
               <a:ext uri="{FF2B5EF4-FFF2-40B4-BE49-F238E27FC236}">
-                <a16:creationId xmlns:a16="http://schemas.microsoft.com/office/drawing/2014/main" id="{2D4A5676-05DA-4617-B1FF-6B711613AC18}"/>
+                <a16:creationId xmlns:a16="http://schemas.microsoft.com/office/drawing/2014/main" id="{C52F1325-8ED8-4D5D-9A18-F033D8E3698B}"/>
               </a:ext>
             </a:extLst>
           </p:cNvPr>
@@ -662,9 +662,9 @@
           <a:bodyPr/>
           <a:lstStyle/>
           <a:p>
-            <a:fld id="{3373EF41-AD06-4E54-890B-37060B951729}" type="datetimeFigureOut">
+            <a:fld id="{1A3BC42B-6901-4EDA-813C-5D3930327F95}" type="datetimeFigureOut">
               <a:rPr lang="pt-BR" smtClean="0"/>
-              <a:t>25/02/2021</a:t>
+              <a:t>08/03/2021</a:t>
             </a:fld>
             <a:endParaRPr lang="pt-BR"/>
           </a:p>
@@ -675,7 +675,7 @@
           <p:cNvPr id="5" name="Espaço Reservado para Rodapé 4">
             <a:extLst>
               <a:ext uri="{FF2B5EF4-FFF2-40B4-BE49-F238E27FC236}">
-                <a16:creationId xmlns:a16="http://schemas.microsoft.com/office/drawing/2014/main" id="{3B90B028-9063-4E0B-9961-A9FC8FE35A2A}"/>
+                <a16:creationId xmlns:a16="http://schemas.microsoft.com/office/drawing/2014/main" id="{8121F828-B36A-45A7-A6AD-70BD82B5B222}"/>
               </a:ext>
             </a:extLst>
           </p:cNvPr>
@@ -700,7 +700,7 @@
           <p:cNvPr id="6" name="Espaço Reservado para Número de Slide 5">
             <a:extLst>
               <a:ext uri="{FF2B5EF4-FFF2-40B4-BE49-F238E27FC236}">
-                <a16:creationId xmlns:a16="http://schemas.microsoft.com/office/drawing/2014/main" id="{0CD7A678-FF58-4DF9-84F4-C5B7F311E571}"/>
+                <a16:creationId xmlns:a16="http://schemas.microsoft.com/office/drawing/2014/main" id="{91A6CA6C-B9B5-4BDD-9321-B76C25DDB50B}"/>
               </a:ext>
             </a:extLst>
           </p:cNvPr>
@@ -716,7 +716,7 @@
           <a:bodyPr/>
           <a:lstStyle/>
           <a:p>
-            <a:fld id="{2C91DB90-DE66-4410-B55F-29C463C8C502}" type="slidenum">
+            <a:fld id="{036ABD3C-081F-4627-9F47-A2982928E032}" type="slidenum">
               <a:rPr lang="pt-BR" smtClean="0"/>
               <a:t>‹nº›</a:t>
             </a:fld>
@@ -727,7 +727,7 @@
     </p:spTree>
     <p:extLst>
       <p:ext uri="{BB962C8B-B14F-4D97-AF65-F5344CB8AC3E}">
-        <p14:creationId xmlns:p14="http://schemas.microsoft.com/office/powerpoint/2010/main" val="2079989750"/>
+        <p14:creationId xmlns:p14="http://schemas.microsoft.com/office/powerpoint/2010/main" val="173376940"/>
       </p:ext>
     </p:extLst>
   </p:cSld>
@@ -759,7 +759,7 @@
           <p:cNvPr id="2" name="Título 1">
             <a:extLst>
               <a:ext uri="{FF2B5EF4-FFF2-40B4-BE49-F238E27FC236}">
-                <a16:creationId xmlns:a16="http://schemas.microsoft.com/office/drawing/2014/main" id="{2734ED7F-7E73-411E-B846-00B47A998E4E}"/>
+                <a16:creationId xmlns:a16="http://schemas.microsoft.com/office/drawing/2014/main" id="{3BBB1535-AD63-42E4-8988-839374BCFFF3}"/>
               </a:ext>
             </a:extLst>
           </p:cNvPr>
@@ -787,7 +787,7 @@
           <p:cNvPr id="3" name="Espaço Reservado para Conteúdo 2">
             <a:extLst>
               <a:ext uri="{FF2B5EF4-FFF2-40B4-BE49-F238E27FC236}">
-                <a16:creationId xmlns:a16="http://schemas.microsoft.com/office/drawing/2014/main" id="{FC4DAF57-2D07-460C-BF91-25DA428044CD}"/>
+                <a16:creationId xmlns:a16="http://schemas.microsoft.com/office/drawing/2014/main" id="{145B297F-889A-432B-A514-E035FFBCEB45}"/>
               </a:ext>
             </a:extLst>
           </p:cNvPr>
@@ -844,7 +844,7 @@
           <p:cNvPr id="4" name="Espaço Reservado para Data 3">
             <a:extLst>
               <a:ext uri="{FF2B5EF4-FFF2-40B4-BE49-F238E27FC236}">
-                <a16:creationId xmlns:a16="http://schemas.microsoft.com/office/drawing/2014/main" id="{E904C73C-4913-463D-A804-E658F6C7DAA0}"/>
+                <a16:creationId xmlns:a16="http://schemas.microsoft.com/office/drawing/2014/main" id="{CDF7A3C0-F9A6-4618-8219-F379494CC518}"/>
               </a:ext>
             </a:extLst>
           </p:cNvPr>
@@ -860,9 +860,9 @@
           <a:bodyPr/>
           <a:lstStyle/>
           <a:p>
-            <a:fld id="{3373EF41-AD06-4E54-890B-37060B951729}" type="datetimeFigureOut">
+            <a:fld id="{1A3BC42B-6901-4EDA-813C-5D3930327F95}" type="datetimeFigureOut">
               <a:rPr lang="pt-BR" smtClean="0"/>
-              <a:t>25/02/2021</a:t>
+              <a:t>08/03/2021</a:t>
             </a:fld>
             <a:endParaRPr lang="pt-BR"/>
           </a:p>
@@ -873,7 +873,7 @@
           <p:cNvPr id="5" name="Espaço Reservado para Rodapé 4">
             <a:extLst>
               <a:ext uri="{FF2B5EF4-FFF2-40B4-BE49-F238E27FC236}">
-                <a16:creationId xmlns:a16="http://schemas.microsoft.com/office/drawing/2014/main" id="{5542BBD4-EC9A-4C2D-B330-D8B943042C7B}"/>
+                <a16:creationId xmlns:a16="http://schemas.microsoft.com/office/drawing/2014/main" id="{E9C9710F-7AAB-4EDA-A49A-A480DA514126}"/>
               </a:ext>
             </a:extLst>
           </p:cNvPr>
@@ -898,7 +898,7 @@
           <p:cNvPr id="6" name="Espaço Reservado para Número de Slide 5">
             <a:extLst>
               <a:ext uri="{FF2B5EF4-FFF2-40B4-BE49-F238E27FC236}">
-                <a16:creationId xmlns:a16="http://schemas.microsoft.com/office/drawing/2014/main" id="{A1AD8F86-9F36-44BF-970C-668B0E0D427B}"/>
+                <a16:creationId xmlns:a16="http://schemas.microsoft.com/office/drawing/2014/main" id="{3DBF61CC-EE37-4B07-B767-B087AADD73A0}"/>
               </a:ext>
             </a:extLst>
           </p:cNvPr>
@@ -914,7 +914,7 @@
           <a:bodyPr/>
           <a:lstStyle/>
           <a:p>
-            <a:fld id="{2C91DB90-DE66-4410-B55F-29C463C8C502}" type="slidenum">
+            <a:fld id="{036ABD3C-081F-4627-9F47-A2982928E032}" type="slidenum">
               <a:rPr lang="pt-BR" smtClean="0"/>
               <a:t>‹nº›</a:t>
             </a:fld>
@@ -925,7 +925,7 @@
     </p:spTree>
     <p:extLst>
       <p:ext uri="{BB962C8B-B14F-4D97-AF65-F5344CB8AC3E}">
-        <p14:creationId xmlns:p14="http://schemas.microsoft.com/office/powerpoint/2010/main" val="95272977"/>
+        <p14:creationId xmlns:p14="http://schemas.microsoft.com/office/powerpoint/2010/main" val="2242775301"/>
       </p:ext>
     </p:extLst>
   </p:cSld>
@@ -957,7 +957,7 @@
           <p:cNvPr id="2" name="Título 1">
             <a:extLst>
               <a:ext uri="{FF2B5EF4-FFF2-40B4-BE49-F238E27FC236}">
-                <a16:creationId xmlns:a16="http://schemas.microsoft.com/office/drawing/2014/main" id="{9C66B8E6-1D0B-4C9E-A9C1-92A65F8FE7F4}"/>
+                <a16:creationId xmlns:a16="http://schemas.microsoft.com/office/drawing/2014/main" id="{87FD9906-691E-4655-BB94-33405D6E53DF}"/>
               </a:ext>
             </a:extLst>
           </p:cNvPr>
@@ -994,7 +994,7 @@
           <p:cNvPr id="3" name="Espaço Reservado para Texto 2">
             <a:extLst>
               <a:ext uri="{FF2B5EF4-FFF2-40B4-BE49-F238E27FC236}">
-                <a16:creationId xmlns:a16="http://schemas.microsoft.com/office/drawing/2014/main" id="{8083BB7C-B32A-4EB3-BC32-1ABC47C9F1D9}"/>
+                <a16:creationId xmlns:a16="http://schemas.microsoft.com/office/drawing/2014/main" id="{391EC6EC-5225-43FF-8C79-069439B771C7}"/>
               </a:ext>
             </a:extLst>
           </p:cNvPr>
@@ -1119,7 +1119,7 @@
           <p:cNvPr id="4" name="Espaço Reservado para Data 3">
             <a:extLst>
               <a:ext uri="{FF2B5EF4-FFF2-40B4-BE49-F238E27FC236}">
-                <a16:creationId xmlns:a16="http://schemas.microsoft.com/office/drawing/2014/main" id="{FF611CC1-E777-49D6-AE41-0919934E194A}"/>
+                <a16:creationId xmlns:a16="http://schemas.microsoft.com/office/drawing/2014/main" id="{EC7A6362-EB1D-4CB3-AC68-2E88171E321E}"/>
               </a:ext>
             </a:extLst>
           </p:cNvPr>
@@ -1135,9 +1135,9 @@
           <a:bodyPr/>
           <a:lstStyle/>
           <a:p>
-            <a:fld id="{3373EF41-AD06-4E54-890B-37060B951729}" type="datetimeFigureOut">
+            <a:fld id="{1A3BC42B-6901-4EDA-813C-5D3930327F95}" type="datetimeFigureOut">
               <a:rPr lang="pt-BR" smtClean="0"/>
-              <a:t>25/02/2021</a:t>
+              <a:t>08/03/2021</a:t>
             </a:fld>
             <a:endParaRPr lang="pt-BR"/>
           </a:p>
@@ -1148,7 +1148,7 @@
           <p:cNvPr id="5" name="Espaço Reservado para Rodapé 4">
             <a:extLst>
               <a:ext uri="{FF2B5EF4-FFF2-40B4-BE49-F238E27FC236}">
-                <a16:creationId xmlns:a16="http://schemas.microsoft.com/office/drawing/2014/main" id="{7B7A1B9C-16BA-455D-9711-2E5742BC30EA}"/>
+                <a16:creationId xmlns:a16="http://schemas.microsoft.com/office/drawing/2014/main" id="{BB1E1FC6-50DB-4DB0-9ECF-026F32049F5E}"/>
               </a:ext>
             </a:extLst>
           </p:cNvPr>
@@ -1173,7 +1173,7 @@
           <p:cNvPr id="6" name="Espaço Reservado para Número de Slide 5">
             <a:extLst>
               <a:ext uri="{FF2B5EF4-FFF2-40B4-BE49-F238E27FC236}">
-                <a16:creationId xmlns:a16="http://schemas.microsoft.com/office/drawing/2014/main" id="{EAFB4376-94B9-4029-B3C0-43BA61AB2A55}"/>
+                <a16:creationId xmlns:a16="http://schemas.microsoft.com/office/drawing/2014/main" id="{28541830-B405-4994-8EF7-AF85149D4DB6}"/>
               </a:ext>
             </a:extLst>
           </p:cNvPr>
@@ -1189,7 +1189,7 @@
           <a:bodyPr/>
           <a:lstStyle/>
           <a:p>
-            <a:fld id="{2C91DB90-DE66-4410-B55F-29C463C8C502}" type="slidenum">
+            <a:fld id="{036ABD3C-081F-4627-9F47-A2982928E032}" type="slidenum">
               <a:rPr lang="pt-BR" smtClean="0"/>
               <a:t>‹nº›</a:t>
             </a:fld>
@@ -1200,7 +1200,7 @@
     </p:spTree>
     <p:extLst>
       <p:ext uri="{BB962C8B-B14F-4D97-AF65-F5344CB8AC3E}">
-        <p14:creationId xmlns:p14="http://schemas.microsoft.com/office/powerpoint/2010/main" val="2437695200"/>
+        <p14:creationId xmlns:p14="http://schemas.microsoft.com/office/powerpoint/2010/main" val="4244472635"/>
       </p:ext>
     </p:extLst>
   </p:cSld>
@@ -1232,7 +1232,7 @@
           <p:cNvPr id="2" name="Título 1">
             <a:extLst>
               <a:ext uri="{FF2B5EF4-FFF2-40B4-BE49-F238E27FC236}">
-                <a16:creationId xmlns:a16="http://schemas.microsoft.com/office/drawing/2014/main" id="{2B19AFE8-49A5-4CF3-BCEA-27203A3F5CDF}"/>
+                <a16:creationId xmlns:a16="http://schemas.microsoft.com/office/drawing/2014/main" id="{D9888EBF-9C56-4151-B185-95DA06452E03}"/>
               </a:ext>
             </a:extLst>
           </p:cNvPr>
@@ -1260,7 +1260,7 @@
           <p:cNvPr id="3" name="Espaço Reservado para Conteúdo 2">
             <a:extLst>
               <a:ext uri="{FF2B5EF4-FFF2-40B4-BE49-F238E27FC236}">
-                <a16:creationId xmlns:a16="http://schemas.microsoft.com/office/drawing/2014/main" id="{FA275B9B-B841-4499-A86B-5DC567A8AAE4}"/>
+                <a16:creationId xmlns:a16="http://schemas.microsoft.com/office/drawing/2014/main" id="{E3AAEBB2-87EF-489C-ADB0-E69C11E15469}"/>
               </a:ext>
             </a:extLst>
           </p:cNvPr>
@@ -1322,7 +1322,7 @@
           <p:cNvPr id="4" name="Espaço Reservado para Conteúdo 3">
             <a:extLst>
               <a:ext uri="{FF2B5EF4-FFF2-40B4-BE49-F238E27FC236}">
-                <a16:creationId xmlns:a16="http://schemas.microsoft.com/office/drawing/2014/main" id="{4B0C3A2C-4213-4ACD-823E-498E672EAAB0}"/>
+                <a16:creationId xmlns:a16="http://schemas.microsoft.com/office/drawing/2014/main" id="{6512ECB7-C318-4FC4-9FC7-EE96F11F2E24}"/>
               </a:ext>
             </a:extLst>
           </p:cNvPr>
@@ -1384,7 +1384,7 @@
           <p:cNvPr id="5" name="Espaço Reservado para Data 4">
             <a:extLst>
               <a:ext uri="{FF2B5EF4-FFF2-40B4-BE49-F238E27FC236}">
-                <a16:creationId xmlns:a16="http://schemas.microsoft.com/office/drawing/2014/main" id="{E72C7648-B173-4475-9A24-2B9B66DF42FF}"/>
+                <a16:creationId xmlns:a16="http://schemas.microsoft.com/office/drawing/2014/main" id="{8ED03167-26DB-44BF-8640-E6E3E2EFCABE}"/>
               </a:ext>
             </a:extLst>
           </p:cNvPr>
@@ -1400,9 +1400,9 @@
           <a:bodyPr/>
           <a:lstStyle/>
           <a:p>
-            <a:fld id="{3373EF41-AD06-4E54-890B-37060B951729}" type="datetimeFigureOut">
+            <a:fld id="{1A3BC42B-6901-4EDA-813C-5D3930327F95}" type="datetimeFigureOut">
               <a:rPr lang="pt-BR" smtClean="0"/>
-              <a:t>25/02/2021</a:t>
+              <a:t>08/03/2021</a:t>
             </a:fld>
             <a:endParaRPr lang="pt-BR"/>
           </a:p>
@@ -1413,7 +1413,7 @@
           <p:cNvPr id="6" name="Espaço Reservado para Rodapé 5">
             <a:extLst>
               <a:ext uri="{FF2B5EF4-FFF2-40B4-BE49-F238E27FC236}">
-                <a16:creationId xmlns:a16="http://schemas.microsoft.com/office/drawing/2014/main" id="{219009C2-3206-44C4-AA65-B56980EE926B}"/>
+                <a16:creationId xmlns:a16="http://schemas.microsoft.com/office/drawing/2014/main" id="{F27E5FB9-5BC9-4956-BA28-1AB3849DAB34}"/>
               </a:ext>
             </a:extLst>
           </p:cNvPr>
@@ -1438,7 +1438,7 @@
           <p:cNvPr id="7" name="Espaço Reservado para Número de Slide 6">
             <a:extLst>
               <a:ext uri="{FF2B5EF4-FFF2-40B4-BE49-F238E27FC236}">
-                <a16:creationId xmlns:a16="http://schemas.microsoft.com/office/drawing/2014/main" id="{F80402B0-77C4-4D9A-80C3-61470DB9B685}"/>
+                <a16:creationId xmlns:a16="http://schemas.microsoft.com/office/drawing/2014/main" id="{8E42472A-0CA8-4420-8FB6-7591BB031B6B}"/>
               </a:ext>
             </a:extLst>
           </p:cNvPr>
@@ -1454,7 +1454,7 @@
           <a:bodyPr/>
           <a:lstStyle/>
           <a:p>
-            <a:fld id="{2C91DB90-DE66-4410-B55F-29C463C8C502}" type="slidenum">
+            <a:fld id="{036ABD3C-081F-4627-9F47-A2982928E032}" type="slidenum">
               <a:rPr lang="pt-BR" smtClean="0"/>
               <a:t>‹nº›</a:t>
             </a:fld>
@@ -1465,7 +1465,7 @@
     </p:spTree>
     <p:extLst>
       <p:ext uri="{BB962C8B-B14F-4D97-AF65-F5344CB8AC3E}">
-        <p14:creationId xmlns:p14="http://schemas.microsoft.com/office/powerpoint/2010/main" val="3111105240"/>
+        <p14:creationId xmlns:p14="http://schemas.microsoft.com/office/powerpoint/2010/main" val="1090884020"/>
       </p:ext>
     </p:extLst>
   </p:cSld>
@@ -1497,7 +1497,7 @@
           <p:cNvPr id="2" name="Título 1">
             <a:extLst>
               <a:ext uri="{FF2B5EF4-FFF2-40B4-BE49-F238E27FC236}">
-                <a16:creationId xmlns:a16="http://schemas.microsoft.com/office/drawing/2014/main" id="{3954831A-6CC1-4A3D-8CB4-2B1B8A30BDBC}"/>
+                <a16:creationId xmlns:a16="http://schemas.microsoft.com/office/drawing/2014/main" id="{647F8EA2-5741-4324-98A9-A6B9517392EE}"/>
               </a:ext>
             </a:extLst>
           </p:cNvPr>
@@ -1530,7 +1530,7 @@
           <p:cNvPr id="3" name="Espaço Reservado para Texto 2">
             <a:extLst>
               <a:ext uri="{FF2B5EF4-FFF2-40B4-BE49-F238E27FC236}">
-                <a16:creationId xmlns:a16="http://schemas.microsoft.com/office/drawing/2014/main" id="{E6A593B5-6ED3-4A2E-A9EF-BC1B280669BC}"/>
+                <a16:creationId xmlns:a16="http://schemas.microsoft.com/office/drawing/2014/main" id="{BF4D4631-0C91-4084-9CA9-183EE6A46EFF}"/>
               </a:ext>
             </a:extLst>
           </p:cNvPr>
@@ -1601,7 +1601,7 @@
           <p:cNvPr id="4" name="Espaço Reservado para Conteúdo 3">
             <a:extLst>
               <a:ext uri="{FF2B5EF4-FFF2-40B4-BE49-F238E27FC236}">
-                <a16:creationId xmlns:a16="http://schemas.microsoft.com/office/drawing/2014/main" id="{DF0C4FA4-0E9A-4EA9-B7B3-C324497AB13B}"/>
+                <a16:creationId xmlns:a16="http://schemas.microsoft.com/office/drawing/2014/main" id="{D4ACEDAD-B405-4CE1-A91F-F39972EBAADC}"/>
               </a:ext>
             </a:extLst>
           </p:cNvPr>
@@ -1663,7 +1663,7 @@
           <p:cNvPr id="5" name="Espaço Reservado para Texto 4">
             <a:extLst>
               <a:ext uri="{FF2B5EF4-FFF2-40B4-BE49-F238E27FC236}">
-                <a16:creationId xmlns:a16="http://schemas.microsoft.com/office/drawing/2014/main" id="{9C77EEE7-D729-4223-88EA-3A16ED211CD9}"/>
+                <a16:creationId xmlns:a16="http://schemas.microsoft.com/office/drawing/2014/main" id="{80279B11-B24E-4F89-BDAA-158C40019A6C}"/>
               </a:ext>
             </a:extLst>
           </p:cNvPr>
@@ -1734,7 +1734,7 @@
           <p:cNvPr id="6" name="Espaço Reservado para Conteúdo 5">
             <a:extLst>
               <a:ext uri="{FF2B5EF4-FFF2-40B4-BE49-F238E27FC236}">
-                <a16:creationId xmlns:a16="http://schemas.microsoft.com/office/drawing/2014/main" id="{75E64970-E300-4517-9577-2A963D01BE07}"/>
+                <a16:creationId xmlns:a16="http://schemas.microsoft.com/office/drawing/2014/main" id="{834E2C06-5FF0-44BA-9689-CB1F17D12D05}"/>
               </a:ext>
             </a:extLst>
           </p:cNvPr>
@@ -1796,7 +1796,7 @@
           <p:cNvPr id="7" name="Espaço Reservado para Data 6">
             <a:extLst>
               <a:ext uri="{FF2B5EF4-FFF2-40B4-BE49-F238E27FC236}">
-                <a16:creationId xmlns:a16="http://schemas.microsoft.com/office/drawing/2014/main" id="{66C478A4-2E8B-4DEF-A1EA-3CD436B80C02}"/>
+                <a16:creationId xmlns:a16="http://schemas.microsoft.com/office/drawing/2014/main" id="{58DE5297-6CAB-4DCF-8C38-37D6E5EB1C7E}"/>
               </a:ext>
             </a:extLst>
           </p:cNvPr>
@@ -1812,9 +1812,9 @@
           <a:bodyPr/>
           <a:lstStyle/>
           <a:p>
-            <a:fld id="{3373EF41-AD06-4E54-890B-37060B951729}" type="datetimeFigureOut">
+            <a:fld id="{1A3BC42B-6901-4EDA-813C-5D3930327F95}" type="datetimeFigureOut">
               <a:rPr lang="pt-BR" smtClean="0"/>
-              <a:t>25/02/2021</a:t>
+              <a:t>08/03/2021</a:t>
             </a:fld>
             <a:endParaRPr lang="pt-BR"/>
           </a:p>
@@ -1825,7 +1825,7 @@
           <p:cNvPr id="8" name="Espaço Reservado para Rodapé 7">
             <a:extLst>
               <a:ext uri="{FF2B5EF4-FFF2-40B4-BE49-F238E27FC236}">
-                <a16:creationId xmlns:a16="http://schemas.microsoft.com/office/drawing/2014/main" id="{E2DAE59F-B761-4591-8075-9B33CDDE16E6}"/>
+                <a16:creationId xmlns:a16="http://schemas.microsoft.com/office/drawing/2014/main" id="{36531477-19A4-4A62-9683-15D701EBA90A}"/>
               </a:ext>
             </a:extLst>
           </p:cNvPr>
@@ -1850,7 +1850,7 @@
           <p:cNvPr id="9" name="Espaço Reservado para Número de Slide 8">
             <a:extLst>
               <a:ext uri="{FF2B5EF4-FFF2-40B4-BE49-F238E27FC236}">
-                <a16:creationId xmlns:a16="http://schemas.microsoft.com/office/drawing/2014/main" id="{DC2219B7-BCBA-4C8B-ABFB-93AA6D1A1249}"/>
+                <a16:creationId xmlns:a16="http://schemas.microsoft.com/office/drawing/2014/main" id="{78677CAA-7726-47B4-AF54-335EFEE62125}"/>
               </a:ext>
             </a:extLst>
           </p:cNvPr>
@@ -1866,7 +1866,7 @@
           <a:bodyPr/>
           <a:lstStyle/>
           <a:p>
-            <a:fld id="{2C91DB90-DE66-4410-B55F-29C463C8C502}" type="slidenum">
+            <a:fld id="{036ABD3C-081F-4627-9F47-A2982928E032}" type="slidenum">
               <a:rPr lang="pt-BR" smtClean="0"/>
               <a:t>‹nº›</a:t>
             </a:fld>
@@ -1877,7 +1877,7 @@
     </p:spTree>
     <p:extLst>
       <p:ext uri="{BB962C8B-B14F-4D97-AF65-F5344CB8AC3E}">
-        <p14:creationId xmlns:p14="http://schemas.microsoft.com/office/powerpoint/2010/main" val="4269069749"/>
+        <p14:creationId xmlns:p14="http://schemas.microsoft.com/office/powerpoint/2010/main" val="854699844"/>
       </p:ext>
     </p:extLst>
   </p:cSld>
@@ -1909,7 +1909,7 @@
           <p:cNvPr id="2" name="Título 1">
             <a:extLst>
               <a:ext uri="{FF2B5EF4-FFF2-40B4-BE49-F238E27FC236}">
-                <a16:creationId xmlns:a16="http://schemas.microsoft.com/office/drawing/2014/main" id="{87EDB8D4-3C79-4A55-B33B-6A5FECDFC2C9}"/>
+                <a16:creationId xmlns:a16="http://schemas.microsoft.com/office/drawing/2014/main" id="{441D1B84-90AB-4CD8-A4C8-88C53D2403C3}"/>
               </a:ext>
             </a:extLst>
           </p:cNvPr>
@@ -1937,7 +1937,7 @@
           <p:cNvPr id="3" name="Espaço Reservado para Data 2">
             <a:extLst>
               <a:ext uri="{FF2B5EF4-FFF2-40B4-BE49-F238E27FC236}">
-                <a16:creationId xmlns:a16="http://schemas.microsoft.com/office/drawing/2014/main" id="{CF7BEEE4-D3F4-4F6C-AF45-8E4C4BEE594B}"/>
+                <a16:creationId xmlns:a16="http://schemas.microsoft.com/office/drawing/2014/main" id="{A932BF8D-C71F-490B-B765-0DE5A1253F08}"/>
               </a:ext>
             </a:extLst>
           </p:cNvPr>
@@ -1953,9 +1953,9 @@
           <a:bodyPr/>
           <a:lstStyle/>
           <a:p>
-            <a:fld id="{3373EF41-AD06-4E54-890B-37060B951729}" type="datetimeFigureOut">
+            <a:fld id="{1A3BC42B-6901-4EDA-813C-5D3930327F95}" type="datetimeFigureOut">
               <a:rPr lang="pt-BR" smtClean="0"/>
-              <a:t>25/02/2021</a:t>
+              <a:t>08/03/2021</a:t>
             </a:fld>
             <a:endParaRPr lang="pt-BR"/>
           </a:p>
@@ -1966,7 +1966,7 @@
           <p:cNvPr id="4" name="Espaço Reservado para Rodapé 3">
             <a:extLst>
               <a:ext uri="{FF2B5EF4-FFF2-40B4-BE49-F238E27FC236}">
-                <a16:creationId xmlns:a16="http://schemas.microsoft.com/office/drawing/2014/main" id="{B6871171-EBFE-490F-8BB7-37F52CAF2734}"/>
+                <a16:creationId xmlns:a16="http://schemas.microsoft.com/office/drawing/2014/main" id="{2E27A47D-DA0C-420F-88A4-5BC5C7BF3831}"/>
               </a:ext>
             </a:extLst>
           </p:cNvPr>
@@ -1991,7 +1991,7 @@
           <p:cNvPr id="5" name="Espaço Reservado para Número de Slide 4">
             <a:extLst>
               <a:ext uri="{FF2B5EF4-FFF2-40B4-BE49-F238E27FC236}">
-                <a16:creationId xmlns:a16="http://schemas.microsoft.com/office/drawing/2014/main" id="{8B7BB468-9035-4A54-8AF3-8384B5F80789}"/>
+                <a16:creationId xmlns:a16="http://schemas.microsoft.com/office/drawing/2014/main" id="{857616BB-9F11-4F99-B10E-730D2C2361CA}"/>
               </a:ext>
             </a:extLst>
           </p:cNvPr>
@@ -2007,7 +2007,7 @@
           <a:bodyPr/>
           <a:lstStyle/>
           <a:p>
-            <a:fld id="{2C91DB90-DE66-4410-B55F-29C463C8C502}" type="slidenum">
+            <a:fld id="{036ABD3C-081F-4627-9F47-A2982928E032}" type="slidenum">
               <a:rPr lang="pt-BR" smtClean="0"/>
               <a:t>‹nº›</a:t>
             </a:fld>
@@ -2018,7 +2018,7 @@
     </p:spTree>
     <p:extLst>
       <p:ext uri="{BB962C8B-B14F-4D97-AF65-F5344CB8AC3E}">
-        <p14:creationId xmlns:p14="http://schemas.microsoft.com/office/powerpoint/2010/main" val="3695478203"/>
+        <p14:creationId xmlns:p14="http://schemas.microsoft.com/office/powerpoint/2010/main" val="3789637273"/>
       </p:ext>
     </p:extLst>
   </p:cSld>
@@ -2050,7 +2050,7 @@
           <p:cNvPr id="2" name="Espaço Reservado para Data 1">
             <a:extLst>
               <a:ext uri="{FF2B5EF4-FFF2-40B4-BE49-F238E27FC236}">
-                <a16:creationId xmlns:a16="http://schemas.microsoft.com/office/drawing/2014/main" id="{7F8DE55F-8E6D-4F69-8718-15E09207A3A1}"/>
+                <a16:creationId xmlns:a16="http://schemas.microsoft.com/office/drawing/2014/main" id="{360337C9-2D66-45B0-9ECE-299572C51D70}"/>
               </a:ext>
             </a:extLst>
           </p:cNvPr>
@@ -2066,9 +2066,9 @@
           <a:bodyPr/>
           <a:lstStyle/>
           <a:p>
-            <a:fld id="{3373EF41-AD06-4E54-890B-37060B951729}" type="datetimeFigureOut">
+            <a:fld id="{1A3BC42B-6901-4EDA-813C-5D3930327F95}" type="datetimeFigureOut">
               <a:rPr lang="pt-BR" smtClean="0"/>
-              <a:t>25/02/2021</a:t>
+              <a:t>08/03/2021</a:t>
             </a:fld>
             <a:endParaRPr lang="pt-BR"/>
           </a:p>
@@ -2079,7 +2079,7 @@
           <p:cNvPr id="3" name="Espaço Reservado para Rodapé 2">
             <a:extLst>
               <a:ext uri="{FF2B5EF4-FFF2-40B4-BE49-F238E27FC236}">
-                <a16:creationId xmlns:a16="http://schemas.microsoft.com/office/drawing/2014/main" id="{A035168D-DFB8-490E-8CE4-472E61007FB5}"/>
+                <a16:creationId xmlns:a16="http://schemas.microsoft.com/office/drawing/2014/main" id="{AC278E1B-9C4D-4BCE-8783-040BCE01EE58}"/>
               </a:ext>
             </a:extLst>
           </p:cNvPr>
@@ -2104,7 +2104,7 @@
           <p:cNvPr id="4" name="Espaço Reservado para Número de Slide 3">
             <a:extLst>
               <a:ext uri="{FF2B5EF4-FFF2-40B4-BE49-F238E27FC236}">
-                <a16:creationId xmlns:a16="http://schemas.microsoft.com/office/drawing/2014/main" id="{F5C7BB50-3C0F-4746-948E-6B2439E3FE8C}"/>
+                <a16:creationId xmlns:a16="http://schemas.microsoft.com/office/drawing/2014/main" id="{3A439A83-83B5-4E7A-9AD5-FAEF47254166}"/>
               </a:ext>
             </a:extLst>
           </p:cNvPr>
@@ -2120,7 +2120,7 @@
           <a:bodyPr/>
           <a:lstStyle/>
           <a:p>
-            <a:fld id="{2C91DB90-DE66-4410-B55F-29C463C8C502}" type="slidenum">
+            <a:fld id="{036ABD3C-081F-4627-9F47-A2982928E032}" type="slidenum">
               <a:rPr lang="pt-BR" smtClean="0"/>
               <a:t>‹nº›</a:t>
             </a:fld>
@@ -2131,7 +2131,7 @@
     </p:spTree>
     <p:extLst>
       <p:ext uri="{BB962C8B-B14F-4D97-AF65-F5344CB8AC3E}">
-        <p14:creationId xmlns:p14="http://schemas.microsoft.com/office/powerpoint/2010/main" val="500243254"/>
+        <p14:creationId xmlns:p14="http://schemas.microsoft.com/office/powerpoint/2010/main" val="4223308742"/>
       </p:ext>
     </p:extLst>
   </p:cSld>
@@ -2163,7 +2163,7 @@
           <p:cNvPr id="2" name="Título 1">
             <a:extLst>
               <a:ext uri="{FF2B5EF4-FFF2-40B4-BE49-F238E27FC236}">
-                <a16:creationId xmlns:a16="http://schemas.microsoft.com/office/drawing/2014/main" id="{067A92C4-B780-461D-B88D-4663C407B619}"/>
+                <a16:creationId xmlns:a16="http://schemas.microsoft.com/office/drawing/2014/main" id="{1CAA5F06-FD0B-4254-88FC-93FE4F94C2A4}"/>
               </a:ext>
             </a:extLst>
           </p:cNvPr>
@@ -2200,7 +2200,7 @@
           <p:cNvPr id="3" name="Espaço Reservado para Conteúdo 2">
             <a:extLst>
               <a:ext uri="{FF2B5EF4-FFF2-40B4-BE49-F238E27FC236}">
-                <a16:creationId xmlns:a16="http://schemas.microsoft.com/office/drawing/2014/main" id="{F5AB14E4-8356-43E8-AA8D-160EA3EDF3F0}"/>
+                <a16:creationId xmlns:a16="http://schemas.microsoft.com/office/drawing/2014/main" id="{A096C615-7AD8-48F0-AF89-F1A6D7B5E2F3}"/>
               </a:ext>
             </a:extLst>
           </p:cNvPr>
@@ -2290,7 +2290,7 @@
           <p:cNvPr id="4" name="Espaço Reservado para Texto 3">
             <a:extLst>
               <a:ext uri="{FF2B5EF4-FFF2-40B4-BE49-F238E27FC236}">
-                <a16:creationId xmlns:a16="http://schemas.microsoft.com/office/drawing/2014/main" id="{E40EE39D-79B2-4F7C-917E-6A09A648355F}"/>
+                <a16:creationId xmlns:a16="http://schemas.microsoft.com/office/drawing/2014/main" id="{B7AE6ECB-FB61-4691-B18B-1E74BCAB7CD6}"/>
               </a:ext>
             </a:extLst>
           </p:cNvPr>
@@ -2361,7 +2361,7 @@
           <p:cNvPr id="5" name="Espaço Reservado para Data 4">
             <a:extLst>
               <a:ext uri="{FF2B5EF4-FFF2-40B4-BE49-F238E27FC236}">
-                <a16:creationId xmlns:a16="http://schemas.microsoft.com/office/drawing/2014/main" id="{CCD451B5-3974-45C2-92B4-417DC4594A50}"/>
+                <a16:creationId xmlns:a16="http://schemas.microsoft.com/office/drawing/2014/main" id="{594DC7C9-DE94-4D9B-88F6-B351411F9162}"/>
               </a:ext>
             </a:extLst>
           </p:cNvPr>
@@ -2377,9 +2377,9 @@
           <a:bodyPr/>
           <a:lstStyle/>
           <a:p>
-            <a:fld id="{3373EF41-AD06-4E54-890B-37060B951729}" type="datetimeFigureOut">
+            <a:fld id="{1A3BC42B-6901-4EDA-813C-5D3930327F95}" type="datetimeFigureOut">
               <a:rPr lang="pt-BR" smtClean="0"/>
-              <a:t>25/02/2021</a:t>
+              <a:t>08/03/2021</a:t>
             </a:fld>
             <a:endParaRPr lang="pt-BR"/>
           </a:p>
@@ -2390,7 +2390,7 @@
           <p:cNvPr id="6" name="Espaço Reservado para Rodapé 5">
             <a:extLst>
               <a:ext uri="{FF2B5EF4-FFF2-40B4-BE49-F238E27FC236}">
-                <a16:creationId xmlns:a16="http://schemas.microsoft.com/office/drawing/2014/main" id="{E6D313CF-F20A-4F0C-89C9-365FE5B996F9}"/>
+                <a16:creationId xmlns:a16="http://schemas.microsoft.com/office/drawing/2014/main" id="{0BA8DBB7-441D-4907-8160-6DB243D81CD9}"/>
               </a:ext>
             </a:extLst>
           </p:cNvPr>
@@ -2415,7 +2415,7 @@
           <p:cNvPr id="7" name="Espaço Reservado para Número de Slide 6">
             <a:extLst>
               <a:ext uri="{FF2B5EF4-FFF2-40B4-BE49-F238E27FC236}">
-                <a16:creationId xmlns:a16="http://schemas.microsoft.com/office/drawing/2014/main" id="{E533FDF5-C4F1-45B1-A31F-A6E9CF3EE8AF}"/>
+                <a16:creationId xmlns:a16="http://schemas.microsoft.com/office/drawing/2014/main" id="{9367F5F2-8278-45F3-965B-BC355924B9F4}"/>
               </a:ext>
             </a:extLst>
           </p:cNvPr>
@@ -2431,7 +2431,7 @@
           <a:bodyPr/>
           <a:lstStyle/>
           <a:p>
-            <a:fld id="{2C91DB90-DE66-4410-B55F-29C463C8C502}" type="slidenum">
+            <a:fld id="{036ABD3C-081F-4627-9F47-A2982928E032}" type="slidenum">
               <a:rPr lang="pt-BR" smtClean="0"/>
               <a:t>‹nº›</a:t>
             </a:fld>
@@ -2442,7 +2442,7 @@
     </p:spTree>
     <p:extLst>
       <p:ext uri="{BB962C8B-B14F-4D97-AF65-F5344CB8AC3E}">
-        <p14:creationId xmlns:p14="http://schemas.microsoft.com/office/powerpoint/2010/main" val="441039467"/>
+        <p14:creationId xmlns:p14="http://schemas.microsoft.com/office/powerpoint/2010/main" val="3107739240"/>
       </p:ext>
     </p:extLst>
   </p:cSld>
@@ -2474,7 +2474,7 @@
           <p:cNvPr id="2" name="Título 1">
             <a:extLst>
               <a:ext uri="{FF2B5EF4-FFF2-40B4-BE49-F238E27FC236}">
-                <a16:creationId xmlns:a16="http://schemas.microsoft.com/office/drawing/2014/main" id="{8F2BA315-4CA8-414A-AF98-1A516CEAE24F}"/>
+                <a16:creationId xmlns:a16="http://schemas.microsoft.com/office/drawing/2014/main" id="{ADC608DA-37F3-47F3-B42F-37712EC16DA6}"/>
               </a:ext>
             </a:extLst>
           </p:cNvPr>
@@ -2511,7 +2511,7 @@
           <p:cNvPr id="3" name="Espaço Reservado para Imagem 2">
             <a:extLst>
               <a:ext uri="{FF2B5EF4-FFF2-40B4-BE49-F238E27FC236}">
-                <a16:creationId xmlns:a16="http://schemas.microsoft.com/office/drawing/2014/main" id="{150BAB9D-677C-49ED-A7C7-D8A8D8962690}"/>
+                <a16:creationId xmlns:a16="http://schemas.microsoft.com/office/drawing/2014/main" id="{68C3BF04-ACE9-4F6D-8CAE-617B947E7018}"/>
               </a:ext>
             </a:extLst>
           </p:cNvPr>
@@ -2578,7 +2578,7 @@
           <p:cNvPr id="4" name="Espaço Reservado para Texto 3">
             <a:extLst>
               <a:ext uri="{FF2B5EF4-FFF2-40B4-BE49-F238E27FC236}">
-                <a16:creationId xmlns:a16="http://schemas.microsoft.com/office/drawing/2014/main" id="{CB44482A-763F-41D8-AFDA-AA6F1B56500F}"/>
+                <a16:creationId xmlns:a16="http://schemas.microsoft.com/office/drawing/2014/main" id="{C1A4779C-9D4E-4987-B2DA-6EB850461FFF}"/>
               </a:ext>
             </a:extLst>
           </p:cNvPr>
@@ -2649,7 +2649,7 @@
           <p:cNvPr id="5" name="Espaço Reservado para Data 4">
             <a:extLst>
               <a:ext uri="{FF2B5EF4-FFF2-40B4-BE49-F238E27FC236}">
-                <a16:creationId xmlns:a16="http://schemas.microsoft.com/office/drawing/2014/main" id="{1DA34C1A-E987-4AC0-BDB9-B3B5B62E412B}"/>
+                <a16:creationId xmlns:a16="http://schemas.microsoft.com/office/drawing/2014/main" id="{A2D55BE6-314C-4675-BC3D-35892D989B70}"/>
               </a:ext>
             </a:extLst>
           </p:cNvPr>
@@ -2665,9 +2665,9 @@
           <a:bodyPr/>
           <a:lstStyle/>
           <a:p>
-            <a:fld id="{3373EF41-AD06-4E54-890B-37060B951729}" type="datetimeFigureOut">
+            <a:fld id="{1A3BC42B-6901-4EDA-813C-5D3930327F95}" type="datetimeFigureOut">
               <a:rPr lang="pt-BR" smtClean="0"/>
-              <a:t>25/02/2021</a:t>
+              <a:t>08/03/2021</a:t>
             </a:fld>
             <a:endParaRPr lang="pt-BR"/>
           </a:p>
@@ -2678,7 +2678,7 @@
           <p:cNvPr id="6" name="Espaço Reservado para Rodapé 5">
             <a:extLst>
               <a:ext uri="{FF2B5EF4-FFF2-40B4-BE49-F238E27FC236}">
-                <a16:creationId xmlns:a16="http://schemas.microsoft.com/office/drawing/2014/main" id="{359DE66D-FE3B-4E10-A908-1D0CD518B8AD}"/>
+                <a16:creationId xmlns:a16="http://schemas.microsoft.com/office/drawing/2014/main" id="{C9DB6FFB-14DE-4CFC-8E0E-BA80C0C62975}"/>
               </a:ext>
             </a:extLst>
           </p:cNvPr>
@@ -2703,7 +2703,7 @@
           <p:cNvPr id="7" name="Espaço Reservado para Número de Slide 6">
             <a:extLst>
               <a:ext uri="{FF2B5EF4-FFF2-40B4-BE49-F238E27FC236}">
-                <a16:creationId xmlns:a16="http://schemas.microsoft.com/office/drawing/2014/main" id="{B0F826AD-047F-4ED6-AD9B-C333EBD9917D}"/>
+                <a16:creationId xmlns:a16="http://schemas.microsoft.com/office/drawing/2014/main" id="{DEB93B25-0FBB-4E55-91DC-6F8AED6BC718}"/>
               </a:ext>
             </a:extLst>
           </p:cNvPr>
@@ -2719,7 +2719,7 @@
           <a:bodyPr/>
           <a:lstStyle/>
           <a:p>
-            <a:fld id="{2C91DB90-DE66-4410-B55F-29C463C8C502}" type="slidenum">
+            <a:fld id="{036ABD3C-081F-4627-9F47-A2982928E032}" type="slidenum">
               <a:rPr lang="pt-BR" smtClean="0"/>
               <a:t>‹nº›</a:t>
             </a:fld>
@@ -2730,7 +2730,7 @@
     </p:spTree>
     <p:extLst>
       <p:ext uri="{BB962C8B-B14F-4D97-AF65-F5344CB8AC3E}">
-        <p14:creationId xmlns:p14="http://schemas.microsoft.com/office/powerpoint/2010/main" val="708141293"/>
+        <p14:creationId xmlns:p14="http://schemas.microsoft.com/office/powerpoint/2010/main" val="4277506012"/>
       </p:ext>
     </p:extLst>
   </p:cSld>
@@ -2767,7 +2767,7 @@
           <p:cNvPr id="2" name="Espaço Reservado para Título 1">
             <a:extLst>
               <a:ext uri="{FF2B5EF4-FFF2-40B4-BE49-F238E27FC236}">
-                <a16:creationId xmlns:a16="http://schemas.microsoft.com/office/drawing/2014/main" id="{48B17A7E-E77D-4081-B5A6-A99E3C2BD7C0}"/>
+                <a16:creationId xmlns:a16="http://schemas.microsoft.com/office/drawing/2014/main" id="{ED6B6FCB-5FA7-4A5E-918B-6079264A461B}"/>
               </a:ext>
             </a:extLst>
           </p:cNvPr>
@@ -2805,7 +2805,7 @@
           <p:cNvPr id="3" name="Espaço Reservado para Texto 2">
             <a:extLst>
               <a:ext uri="{FF2B5EF4-FFF2-40B4-BE49-F238E27FC236}">
-                <a16:creationId xmlns:a16="http://schemas.microsoft.com/office/drawing/2014/main" id="{7EB6A94A-1E88-4C3B-A80C-9C74C9288EF1}"/>
+                <a16:creationId xmlns:a16="http://schemas.microsoft.com/office/drawing/2014/main" id="{B91545C9-3833-4C11-84D6-20AF832B3599}"/>
               </a:ext>
             </a:extLst>
           </p:cNvPr>
@@ -2872,7 +2872,7 @@
           <p:cNvPr id="4" name="Espaço Reservado para Data 3">
             <a:extLst>
               <a:ext uri="{FF2B5EF4-FFF2-40B4-BE49-F238E27FC236}">
-                <a16:creationId xmlns:a16="http://schemas.microsoft.com/office/drawing/2014/main" id="{E937C09E-51FC-4599-8F75-E10A9C9EEBC0}"/>
+                <a16:creationId xmlns:a16="http://schemas.microsoft.com/office/drawing/2014/main" id="{3D807EDC-F9AB-4008-B60C-28768354B0B8}"/>
               </a:ext>
             </a:extLst>
           </p:cNvPr>
@@ -2906,9 +2906,9 @@
             </a:lvl1pPr>
           </a:lstStyle>
           <a:p>
-            <a:fld id="{3373EF41-AD06-4E54-890B-37060B951729}" type="datetimeFigureOut">
+            <a:fld id="{1A3BC42B-6901-4EDA-813C-5D3930327F95}" type="datetimeFigureOut">
               <a:rPr lang="pt-BR" smtClean="0"/>
-              <a:t>25/02/2021</a:t>
+              <a:t>08/03/2021</a:t>
             </a:fld>
             <a:endParaRPr lang="pt-BR"/>
           </a:p>
@@ -2919,7 +2919,7 @@
           <p:cNvPr id="5" name="Espaço Reservado para Rodapé 4">
             <a:extLst>
               <a:ext uri="{FF2B5EF4-FFF2-40B4-BE49-F238E27FC236}">
-                <a16:creationId xmlns:a16="http://schemas.microsoft.com/office/drawing/2014/main" id="{F354C143-4357-470C-9E7C-DC0FDA24E056}"/>
+                <a16:creationId xmlns:a16="http://schemas.microsoft.com/office/drawing/2014/main" id="{C1738682-2354-46C4-BEB0-3248E2CF3806}"/>
               </a:ext>
             </a:extLst>
           </p:cNvPr>
@@ -2962,7 +2962,7 @@
           <p:cNvPr id="6" name="Espaço Reservado para Número de Slide 5">
             <a:extLst>
               <a:ext uri="{FF2B5EF4-FFF2-40B4-BE49-F238E27FC236}">
-                <a16:creationId xmlns:a16="http://schemas.microsoft.com/office/drawing/2014/main" id="{749ADB46-0999-46B5-8CA5-BA0D23DFABC9}"/>
+                <a16:creationId xmlns:a16="http://schemas.microsoft.com/office/drawing/2014/main" id="{4B52EE7A-8F40-4D22-8A00-1D18C9CAE875}"/>
               </a:ext>
             </a:extLst>
           </p:cNvPr>
@@ -2996,7 +2996,7 @@
             </a:lvl1pPr>
           </a:lstStyle>
           <a:p>
-            <a:fld id="{2C91DB90-DE66-4410-B55F-29C463C8C502}" type="slidenum">
+            <a:fld id="{036ABD3C-081F-4627-9F47-A2982928E032}" type="slidenum">
               <a:rPr lang="pt-BR" smtClean="0"/>
               <a:t>‹nº›</a:t>
             </a:fld>
@@ -3007,7 +3007,7 @@
     </p:spTree>
     <p:extLst>
       <p:ext uri="{BB962C8B-B14F-4D97-AF65-F5344CB8AC3E}">
-        <p14:creationId xmlns:p14="http://schemas.microsoft.com/office/powerpoint/2010/main" val="3396001781"/>
+        <p14:creationId xmlns:p14="http://schemas.microsoft.com/office/powerpoint/2010/main" val="329548638"/>
       </p:ext>
     </p:extLst>
   </p:cSld>
@@ -3325,46 +3325,398 @@
           <a:chExt cx="0" cy="0"/>
         </a:xfrm>
       </p:grpSpPr>
-      <p:pic>
-        <p:nvPicPr>
-          <p:cNvPr id="5" name="Imagem 4">
-            <a:extLst>
-              <a:ext uri="{FF2B5EF4-FFF2-40B4-BE49-F238E27FC236}">
-                <a16:creationId xmlns:a16="http://schemas.microsoft.com/office/drawing/2014/main" id="{93D125F0-EF1B-4C63-95F3-7F6D66711D16}"/>
-              </a:ext>
-            </a:extLst>
-          </p:cNvPr>
-          <p:cNvPicPr>
-            <a:picLocks noChangeAspect="1"/>
-          </p:cNvPicPr>
+      <p:sp>
+        <p:nvSpPr>
+          <p:cNvPr id="2" name="Título 1">
+            <a:extLst>
+              <a:ext uri="{FF2B5EF4-FFF2-40B4-BE49-F238E27FC236}">
+                <a16:creationId xmlns:a16="http://schemas.microsoft.com/office/drawing/2014/main" id="{10E9161D-AEDA-437F-9B01-20136588A889}"/>
+              </a:ext>
+            </a:extLst>
+          </p:cNvPr>
+          <p:cNvSpPr>
+            <a:spLocks noGrp="1"/>
+          </p:cNvSpPr>
+          <p:nvPr>
+            <p:ph type="ctrTitle"/>
+          </p:nvPr>
+        </p:nvSpPr>
+        <p:spPr>
+          <a:xfrm>
+            <a:off x="1524000" y="365759"/>
+            <a:ext cx="9144000" cy="941692"/>
+          </a:xfrm>
+        </p:spPr>
+        <p:txBody>
+          <a:bodyPr/>
+          <a:lstStyle/>
+          <a:p>
+            <a:r>
+              <a:rPr lang="pt-BR" dirty="0"/>
+              <a:t>Contexto de Negócio</a:t>
+            </a:r>
+          </a:p>
+        </p:txBody>
+      </p:sp>
+      <p:sp>
+        <p:nvSpPr>
+          <p:cNvPr id="4" name="Retângulo 3">
+            <a:extLst>
+              <a:ext uri="{FF2B5EF4-FFF2-40B4-BE49-F238E27FC236}">
+                <a16:creationId xmlns:a16="http://schemas.microsoft.com/office/drawing/2014/main" id="{13AEF939-D445-47D9-A6DE-909882F80642}"/>
+              </a:ext>
+            </a:extLst>
+          </p:cNvPr>
+          <p:cNvSpPr/>
           <p:nvPr/>
-        </p:nvPicPr>
-        <p:blipFill>
-          <a:blip r:embed="rId2">
-            <a:extLst>
-              <a:ext uri="{28A0092B-C50C-407E-A947-70E740481C1C}">
-                <a14:useLocalDpi xmlns:a14="http://schemas.microsoft.com/office/drawing/2010/main" val="0"/>
-              </a:ext>
-            </a:extLst>
-          </a:blip>
-          <a:stretch>
-            <a:fillRect/>
-          </a:stretch>
-        </p:blipFill>
+        </p:nvSpPr>
         <p:spPr>
           <a:xfrm>
-            <a:off x="1107937" y="1266387"/>
-            <a:ext cx="9830057" cy="4325225"/>
+            <a:off x="683855" y="2513606"/>
+            <a:ext cx="2488759" cy="1144988"/>
           </a:xfrm>
           <a:prstGeom prst="rect">
             <a:avLst/>
           </a:prstGeom>
         </p:spPr>
-      </p:pic>
+        <p:style>
+          <a:lnRef idx="2">
+            <a:schemeClr val="accent1">
+              <a:shade val="50000"/>
+            </a:schemeClr>
+          </a:lnRef>
+          <a:fillRef idx="1">
+            <a:schemeClr val="accent1"/>
+          </a:fillRef>
+          <a:effectRef idx="0">
+            <a:schemeClr val="accent1"/>
+          </a:effectRef>
+          <a:fontRef idx="minor">
+            <a:schemeClr val="lt1"/>
+          </a:fontRef>
+        </p:style>
+        <p:txBody>
+          <a:bodyPr rtlCol="0" anchor="ctr"/>
+          <a:lstStyle/>
+          <a:p>
+            <a:pPr algn="ctr"/>
+            <a:r>
+              <a:rPr lang="pt-BR" dirty="0"/>
+              <a:t>Cliente (Turista)</a:t>
+            </a:r>
+          </a:p>
+        </p:txBody>
+      </p:sp>
+      <p:sp>
+        <p:nvSpPr>
+          <p:cNvPr id="5" name="Retângulo: Cantos Arredondados 4">
+            <a:extLst>
+              <a:ext uri="{FF2B5EF4-FFF2-40B4-BE49-F238E27FC236}">
+                <a16:creationId xmlns:a16="http://schemas.microsoft.com/office/drawing/2014/main" id="{2A64DC67-6DBF-4469-95D3-D5F9B6598D6E}"/>
+              </a:ext>
+            </a:extLst>
+          </p:cNvPr>
+          <p:cNvSpPr/>
+          <p:nvPr/>
+        </p:nvSpPr>
+        <p:spPr>
+          <a:xfrm>
+            <a:off x="7395376" y="1851660"/>
+            <a:ext cx="4214191" cy="3975652"/>
+          </a:xfrm>
+          <a:prstGeom prst="roundRect">
+            <a:avLst/>
+          </a:prstGeom>
+          <a:noFill/>
+          <a:ln>
+            <a:solidFill>
+              <a:schemeClr val="tx1"/>
+            </a:solidFill>
+          </a:ln>
+        </p:spPr>
+        <p:style>
+          <a:lnRef idx="2">
+            <a:schemeClr val="accent1">
+              <a:shade val="50000"/>
+            </a:schemeClr>
+          </a:lnRef>
+          <a:fillRef idx="1">
+            <a:schemeClr val="accent1"/>
+          </a:fillRef>
+          <a:effectRef idx="0">
+            <a:schemeClr val="accent1"/>
+          </a:effectRef>
+          <a:fontRef idx="minor">
+            <a:schemeClr val="lt1"/>
+          </a:fontRef>
+        </p:style>
+        <p:txBody>
+          <a:bodyPr rtlCol="0" anchor="ctr"/>
+          <a:lstStyle/>
+          <a:p>
+            <a:pPr algn="ctr"/>
+            <a:endParaRPr lang="pt-BR"/>
+          </a:p>
+        </p:txBody>
+      </p:sp>
+      <p:sp>
+        <p:nvSpPr>
+          <p:cNvPr id="6" name="CaixaDeTexto 5">
+            <a:extLst>
+              <a:ext uri="{FF2B5EF4-FFF2-40B4-BE49-F238E27FC236}">
+                <a16:creationId xmlns:a16="http://schemas.microsoft.com/office/drawing/2014/main" id="{6F7509BA-1780-49AA-B2ED-1C7A772E014F}"/>
+              </a:ext>
+            </a:extLst>
+          </p:cNvPr>
+          <p:cNvSpPr txBox="1"/>
+          <p:nvPr/>
+        </p:nvSpPr>
+        <p:spPr>
+          <a:xfrm>
+            <a:off x="7967285" y="3639431"/>
+            <a:ext cx="3070371" cy="400110"/>
+          </a:xfrm>
+          <a:prstGeom prst="rect">
+            <a:avLst/>
+          </a:prstGeom>
+          <a:noFill/>
+        </p:spPr>
+        <p:txBody>
+          <a:bodyPr wrap="square" rtlCol="0">
+            <a:spAutoFit/>
+          </a:bodyPr>
+          <a:lstStyle/>
+          <a:p>
+            <a:pPr algn="ctr"/>
+            <a:r>
+              <a:rPr lang="pt-BR" sz="2000" dirty="0"/>
+              <a:t> Cida Excursões</a:t>
+            </a:r>
+          </a:p>
+        </p:txBody>
+      </p:sp>
+      <p:cxnSp>
+        <p:nvCxnSpPr>
+          <p:cNvPr id="8" name="Conector reto 7">
+            <a:extLst>
+              <a:ext uri="{FF2B5EF4-FFF2-40B4-BE49-F238E27FC236}">
+                <a16:creationId xmlns:a16="http://schemas.microsoft.com/office/drawing/2014/main" id="{6F6EC289-6DA4-49D7-9A13-3D08C5BB2B31}"/>
+              </a:ext>
+            </a:extLst>
+          </p:cNvPr>
+          <p:cNvCxnSpPr>
+            <a:cxnSpLocks/>
+            <a:stCxn id="4" idx="3"/>
+          </p:cNvCxnSpPr>
+          <p:nvPr/>
+        </p:nvCxnSpPr>
+        <p:spPr>
+          <a:xfrm>
+            <a:off x="3172614" y="3086100"/>
+            <a:ext cx="4222762" cy="0"/>
+          </a:xfrm>
+          <a:prstGeom prst="line">
+            <a:avLst/>
+          </a:prstGeom>
+        </p:spPr>
+        <p:style>
+          <a:lnRef idx="1">
+            <a:schemeClr val="dk1"/>
+          </a:lnRef>
+          <a:fillRef idx="0">
+            <a:schemeClr val="dk1"/>
+          </a:fillRef>
+          <a:effectRef idx="0">
+            <a:schemeClr val="dk1"/>
+          </a:effectRef>
+          <a:fontRef idx="minor">
+            <a:schemeClr val="tx1"/>
+          </a:fontRef>
+        </p:style>
+      </p:cxnSp>
+      <p:sp>
+        <p:nvSpPr>
+          <p:cNvPr id="9" name="CaixaDeTexto 8">
+            <a:extLst>
+              <a:ext uri="{FF2B5EF4-FFF2-40B4-BE49-F238E27FC236}">
+                <a16:creationId xmlns:a16="http://schemas.microsoft.com/office/drawing/2014/main" id="{68D65375-8DF7-4227-B8DA-C0DA5EA957E4}"/>
+              </a:ext>
+            </a:extLst>
+          </p:cNvPr>
+          <p:cNvSpPr txBox="1"/>
+          <p:nvPr/>
+        </p:nvSpPr>
+        <p:spPr>
+          <a:xfrm>
+            <a:off x="3236114" y="2144533"/>
+            <a:ext cx="3028426" cy="923330"/>
+          </a:xfrm>
+          <a:prstGeom prst="rect">
+            <a:avLst/>
+          </a:prstGeom>
+          <a:noFill/>
+        </p:spPr>
+        <p:txBody>
+          <a:bodyPr wrap="square" rtlCol="0">
+            <a:spAutoFit/>
+          </a:bodyPr>
+          <a:lstStyle/>
+          <a:p>
+            <a:pPr marL="342900" indent="-342900">
+              <a:buAutoNum type="arabicPeriod"/>
+            </a:pPr>
+            <a:r>
+              <a:rPr lang="pt-BR" dirty="0"/>
+              <a:t>Adquirir pacote de viagem</a:t>
+            </a:r>
+          </a:p>
+          <a:p>
+            <a:pPr marL="342900" indent="-342900">
+              <a:buAutoNum type="arabicPeriod"/>
+            </a:pPr>
+            <a:r>
+              <a:rPr lang="pt-BR" dirty="0"/>
+              <a:t>Avaliar viagem</a:t>
+            </a:r>
+          </a:p>
+          <a:p>
+            <a:pPr marL="342900" indent="-342900">
+              <a:buAutoNum type="arabicPeriod"/>
+            </a:pPr>
+            <a:r>
+              <a:rPr lang="pt-BR" dirty="0"/>
+              <a:t>Cancelar viagem</a:t>
+            </a:r>
+          </a:p>
+        </p:txBody>
+      </p:sp>
+      <p:sp>
+        <p:nvSpPr>
+          <p:cNvPr id="10" name="Retângulo 9">
+            <a:extLst>
+              <a:ext uri="{FF2B5EF4-FFF2-40B4-BE49-F238E27FC236}">
+                <a16:creationId xmlns:a16="http://schemas.microsoft.com/office/drawing/2014/main" id="{D608A37D-8EE1-4EDF-BCE8-C903B5DB5958}"/>
+              </a:ext>
+            </a:extLst>
+          </p:cNvPr>
+          <p:cNvSpPr/>
+          <p:nvPr/>
+        </p:nvSpPr>
+        <p:spPr>
+          <a:xfrm>
+            <a:off x="683855" y="4212851"/>
+            <a:ext cx="2488759" cy="1218717"/>
+          </a:xfrm>
+          <a:prstGeom prst="rect">
+            <a:avLst/>
+          </a:prstGeom>
+        </p:spPr>
+        <p:style>
+          <a:lnRef idx="2">
+            <a:schemeClr val="accent2">
+              <a:shade val="50000"/>
+            </a:schemeClr>
+          </a:lnRef>
+          <a:fillRef idx="1">
+            <a:schemeClr val="accent2"/>
+          </a:fillRef>
+          <a:effectRef idx="0">
+            <a:schemeClr val="accent2"/>
+          </a:effectRef>
+          <a:fontRef idx="minor">
+            <a:schemeClr val="lt1"/>
+          </a:fontRef>
+        </p:style>
+        <p:txBody>
+          <a:bodyPr rtlCol="0" anchor="ctr"/>
+          <a:lstStyle/>
+          <a:p>
+            <a:pPr algn="ctr"/>
+            <a:r>
+              <a:rPr lang="pt-BR" dirty="0"/>
+              <a:t>Guia Turístico</a:t>
+            </a:r>
+          </a:p>
+        </p:txBody>
+      </p:sp>
+      <p:cxnSp>
+        <p:nvCxnSpPr>
+          <p:cNvPr id="12" name="Conector reto 11">
+            <a:extLst>
+              <a:ext uri="{FF2B5EF4-FFF2-40B4-BE49-F238E27FC236}">
+                <a16:creationId xmlns:a16="http://schemas.microsoft.com/office/drawing/2014/main" id="{5F67736E-DF11-4760-93B4-BD2135D965ED}"/>
+              </a:ext>
+            </a:extLst>
+          </p:cNvPr>
+          <p:cNvCxnSpPr>
+            <a:cxnSpLocks/>
+            <a:stCxn id="10" idx="3"/>
+          </p:cNvCxnSpPr>
+          <p:nvPr/>
+        </p:nvCxnSpPr>
+        <p:spPr>
+          <a:xfrm>
+            <a:off x="3172614" y="4822210"/>
+            <a:ext cx="4222762" cy="0"/>
+          </a:xfrm>
+          <a:prstGeom prst="line">
+            <a:avLst/>
+          </a:prstGeom>
+        </p:spPr>
+        <p:style>
+          <a:lnRef idx="1">
+            <a:schemeClr val="dk1"/>
+          </a:lnRef>
+          <a:fillRef idx="0">
+            <a:schemeClr val="dk1"/>
+          </a:fillRef>
+          <a:effectRef idx="0">
+            <a:schemeClr val="dk1"/>
+          </a:effectRef>
+          <a:fontRef idx="minor">
+            <a:schemeClr val="tx1"/>
+          </a:fontRef>
+        </p:style>
+      </p:cxnSp>
+      <p:sp>
+        <p:nvSpPr>
+          <p:cNvPr id="14" name="CaixaDeTexto 13">
+            <a:extLst>
+              <a:ext uri="{FF2B5EF4-FFF2-40B4-BE49-F238E27FC236}">
+                <a16:creationId xmlns:a16="http://schemas.microsoft.com/office/drawing/2014/main" id="{55074123-AFB1-4F02-9D0A-A09B256E9A86}"/>
+              </a:ext>
+            </a:extLst>
+          </p:cNvPr>
+          <p:cNvSpPr txBox="1"/>
+          <p:nvPr/>
+        </p:nvSpPr>
+        <p:spPr>
+          <a:xfrm>
+            <a:off x="3236693" y="4434641"/>
+            <a:ext cx="2700035" cy="369332"/>
+          </a:xfrm>
+          <a:prstGeom prst="rect">
+            <a:avLst/>
+          </a:prstGeom>
+          <a:noFill/>
+        </p:spPr>
+        <p:txBody>
+          <a:bodyPr wrap="none" rtlCol="0">
+            <a:spAutoFit/>
+          </a:bodyPr>
+          <a:lstStyle/>
+          <a:p>
+            <a:r>
+              <a:rPr lang="pt-BR" dirty="0"/>
+              <a:t>4. Fornecer serviço de guia</a:t>
+            </a:r>
+          </a:p>
+        </p:txBody>
+      </p:sp>
     </p:spTree>
     <p:extLst>
       <p:ext uri="{BB962C8B-B14F-4D97-AF65-F5344CB8AC3E}">
-        <p14:creationId xmlns:p14="http://schemas.microsoft.com/office/powerpoint/2010/main" val="3478839698"/>
+        <p14:creationId xmlns:p14="http://schemas.microsoft.com/office/powerpoint/2010/main" val="704146561"/>
       </p:ext>
     </p:extLst>
   </p:cSld>
@@ -3391,45 +3743,323 @@
           <a:chExt cx="0" cy="0"/>
         </a:xfrm>
       </p:grpSpPr>
-      <p:pic>
-        <p:nvPicPr>
-          <p:cNvPr id="5" name="Imagem 4">
-            <a:extLst>
-              <a:ext uri="{FF2B5EF4-FFF2-40B4-BE49-F238E27FC236}">
-                <a16:creationId xmlns:a16="http://schemas.microsoft.com/office/drawing/2014/main" id="{93D125F0-EF1B-4C63-95F3-7F6D66711D16}"/>
-              </a:ext>
-            </a:extLst>
-          </p:cNvPr>
-          <p:cNvPicPr>
-            <a:picLocks noChangeAspect="1"/>
-          </p:cNvPicPr>
+      <p:sp>
+        <p:nvSpPr>
+          <p:cNvPr id="2" name="Título 1">
+            <a:extLst>
+              <a:ext uri="{FF2B5EF4-FFF2-40B4-BE49-F238E27FC236}">
+                <a16:creationId xmlns:a16="http://schemas.microsoft.com/office/drawing/2014/main" id="{D9329562-D0DB-446E-8355-89873C8CEBAF}"/>
+              </a:ext>
+            </a:extLst>
+          </p:cNvPr>
+          <p:cNvSpPr>
+            <a:spLocks noGrp="1"/>
+          </p:cNvSpPr>
+          <p:nvPr>
+            <p:ph type="title"/>
+          </p:nvPr>
+        </p:nvSpPr>
+        <p:spPr/>
+        <p:txBody>
+          <a:bodyPr/>
+          <a:lstStyle/>
+          <a:p>
+            <a:r>
+              <a:rPr lang="pt-BR" dirty="0"/>
+              <a:t>Cenário: Adquirir pacote de viagem</a:t>
+            </a:r>
+          </a:p>
+        </p:txBody>
+      </p:sp>
+      <p:sp>
+        <p:nvSpPr>
+          <p:cNvPr id="5" name="Retângulo 4">
+            <a:extLst>
+              <a:ext uri="{FF2B5EF4-FFF2-40B4-BE49-F238E27FC236}">
+                <a16:creationId xmlns:a16="http://schemas.microsoft.com/office/drawing/2014/main" id="{026A3D63-CC7C-446C-B997-4629105EA2DE}"/>
+              </a:ext>
+            </a:extLst>
+          </p:cNvPr>
+          <p:cNvSpPr/>
           <p:nvPr/>
-        </p:nvPicPr>
-        <p:blipFill>
-          <a:blip r:embed="rId2">
-            <a:extLst>
-              <a:ext uri="{28A0092B-C50C-407E-A947-70E740481C1C}">
-                <a14:useLocalDpi xmlns:a14="http://schemas.microsoft.com/office/drawing/2010/main" val="0"/>
-              </a:ext>
-            </a:extLst>
-          </a:blip>
-          <a:srcRect/>
-          <a:stretch/>
-        </p:blipFill>
+        </p:nvSpPr>
         <p:spPr>
           <a:xfrm>
-            <a:off x="1141046" y="1266387"/>
-            <a:ext cx="9314991" cy="4544189"/>
+            <a:off x="582433" y="2441768"/>
+            <a:ext cx="2488759" cy="1144988"/>
           </a:xfrm>
           <a:prstGeom prst="rect">
             <a:avLst/>
           </a:prstGeom>
         </p:spPr>
-      </p:pic>
+        <p:style>
+          <a:lnRef idx="2">
+            <a:schemeClr val="accent1">
+              <a:shade val="50000"/>
+            </a:schemeClr>
+          </a:lnRef>
+          <a:fillRef idx="1">
+            <a:schemeClr val="accent1"/>
+          </a:fillRef>
+          <a:effectRef idx="0">
+            <a:schemeClr val="accent1"/>
+          </a:effectRef>
+          <a:fontRef idx="minor">
+            <a:schemeClr val="lt1"/>
+          </a:fontRef>
+        </p:style>
+        <p:txBody>
+          <a:bodyPr rtlCol="0" anchor="ctr"/>
+          <a:lstStyle/>
+          <a:p>
+            <a:pPr algn="ctr"/>
+            <a:r>
+              <a:rPr lang="pt-BR" dirty="0"/>
+              <a:t>Cliente (Turista)</a:t>
+            </a:r>
+          </a:p>
+        </p:txBody>
+      </p:sp>
+      <p:sp>
+        <p:nvSpPr>
+          <p:cNvPr id="6" name="Retângulo: Cantos Arredondados 5">
+            <a:extLst>
+              <a:ext uri="{FF2B5EF4-FFF2-40B4-BE49-F238E27FC236}">
+                <a16:creationId xmlns:a16="http://schemas.microsoft.com/office/drawing/2014/main" id="{AAB2747B-D53A-4C31-B074-F5EB85D56539}"/>
+              </a:ext>
+            </a:extLst>
+          </p:cNvPr>
+          <p:cNvSpPr/>
+          <p:nvPr/>
+        </p:nvSpPr>
+        <p:spPr>
+          <a:xfrm>
+            <a:off x="7249324" y="1855912"/>
+            <a:ext cx="4214191" cy="3975652"/>
+          </a:xfrm>
+          <a:prstGeom prst="roundRect">
+            <a:avLst/>
+          </a:prstGeom>
+          <a:noFill/>
+          <a:ln>
+            <a:solidFill>
+              <a:schemeClr val="tx1"/>
+            </a:solidFill>
+          </a:ln>
+        </p:spPr>
+        <p:style>
+          <a:lnRef idx="2">
+            <a:schemeClr val="accent1">
+              <a:shade val="50000"/>
+            </a:schemeClr>
+          </a:lnRef>
+          <a:fillRef idx="1">
+            <a:schemeClr val="accent1"/>
+          </a:fillRef>
+          <a:effectRef idx="0">
+            <a:schemeClr val="accent1"/>
+          </a:effectRef>
+          <a:fontRef idx="minor">
+            <a:schemeClr val="lt1"/>
+          </a:fontRef>
+        </p:style>
+        <p:txBody>
+          <a:bodyPr rtlCol="0" anchor="ctr"/>
+          <a:lstStyle/>
+          <a:p>
+            <a:pPr algn="ctr"/>
+            <a:endParaRPr lang="pt-BR"/>
+          </a:p>
+        </p:txBody>
+      </p:sp>
+      <p:sp>
+        <p:nvSpPr>
+          <p:cNvPr id="10" name="Cubo 9">
+            <a:extLst>
+              <a:ext uri="{FF2B5EF4-FFF2-40B4-BE49-F238E27FC236}">
+                <a16:creationId xmlns:a16="http://schemas.microsoft.com/office/drawing/2014/main" id="{CAE478A0-8075-4F7D-8580-FEF862A42DD5}"/>
+              </a:ext>
+            </a:extLst>
+          </p:cNvPr>
+          <p:cNvSpPr/>
+          <p:nvPr/>
+        </p:nvSpPr>
+        <p:spPr>
+          <a:xfrm>
+            <a:off x="8054670" y="2284012"/>
+            <a:ext cx="2895600" cy="1168400"/>
+          </a:xfrm>
+          <a:prstGeom prst="cube">
+            <a:avLst/>
+          </a:prstGeom>
+        </p:spPr>
+        <p:style>
+          <a:lnRef idx="2">
+            <a:schemeClr val="accent4">
+              <a:shade val="50000"/>
+            </a:schemeClr>
+          </a:lnRef>
+          <a:fillRef idx="1">
+            <a:schemeClr val="accent4"/>
+          </a:fillRef>
+          <a:effectRef idx="0">
+            <a:schemeClr val="accent4"/>
+          </a:effectRef>
+          <a:fontRef idx="minor">
+            <a:schemeClr val="lt1"/>
+          </a:fontRef>
+        </p:style>
+        <p:txBody>
+          <a:bodyPr rtlCol="0" anchor="ctr"/>
+          <a:lstStyle/>
+          <a:p>
+            <a:pPr algn="ctr"/>
+            <a:r>
+              <a:rPr lang="pt-BR" dirty="0"/>
+              <a:t>Vendas </a:t>
+            </a:r>
+          </a:p>
+          <a:p>
+            <a:pPr algn="ctr"/>
+            <a:r>
+              <a:rPr lang="pt-BR" dirty="0"/>
+              <a:t>(Nó Operacional)</a:t>
+            </a:r>
+          </a:p>
+        </p:txBody>
+      </p:sp>
+      <p:sp>
+        <p:nvSpPr>
+          <p:cNvPr id="11" name="Retângulo 10">
+            <a:extLst>
+              <a:ext uri="{FF2B5EF4-FFF2-40B4-BE49-F238E27FC236}">
+                <a16:creationId xmlns:a16="http://schemas.microsoft.com/office/drawing/2014/main" id="{0556F066-5EF1-4D1B-98B6-00923C81CCF6}"/>
+              </a:ext>
+            </a:extLst>
+          </p:cNvPr>
+          <p:cNvSpPr/>
+          <p:nvPr/>
+        </p:nvSpPr>
+        <p:spPr>
+          <a:xfrm>
+            <a:off x="8112039" y="4067368"/>
+            <a:ext cx="2488759" cy="1144988"/>
+          </a:xfrm>
+          <a:prstGeom prst="rect">
+            <a:avLst/>
+          </a:prstGeom>
+        </p:spPr>
+        <p:style>
+          <a:lnRef idx="2">
+            <a:schemeClr val="accent6">
+              <a:shade val="50000"/>
+            </a:schemeClr>
+          </a:lnRef>
+          <a:fillRef idx="1">
+            <a:schemeClr val="accent6"/>
+          </a:fillRef>
+          <a:effectRef idx="0">
+            <a:schemeClr val="accent6"/>
+          </a:effectRef>
+          <a:fontRef idx="minor">
+            <a:schemeClr val="lt1"/>
+          </a:fontRef>
+        </p:style>
+        <p:txBody>
+          <a:bodyPr rtlCol="0" anchor="ctr"/>
+          <a:lstStyle/>
+          <a:p>
+            <a:pPr algn="ctr"/>
+            <a:r>
+              <a:rPr lang="pt-BR" dirty="0"/>
+              <a:t>Tratar da venda da excursão</a:t>
+            </a:r>
+          </a:p>
+        </p:txBody>
+      </p:sp>
+      <p:cxnSp>
+        <p:nvCxnSpPr>
+          <p:cNvPr id="13" name="Conector reto 12">
+            <a:extLst>
+              <a:ext uri="{FF2B5EF4-FFF2-40B4-BE49-F238E27FC236}">
+                <a16:creationId xmlns:a16="http://schemas.microsoft.com/office/drawing/2014/main" id="{CCDD4109-CD45-4B84-9607-8A21E8232B20}"/>
+              </a:ext>
+            </a:extLst>
+          </p:cNvPr>
+          <p:cNvCxnSpPr>
+            <a:stCxn id="5" idx="3"/>
+            <a:endCxn id="10" idx="2"/>
+          </p:cNvCxnSpPr>
+          <p:nvPr/>
+        </p:nvCxnSpPr>
+        <p:spPr>
+          <a:xfrm>
+            <a:off x="3071192" y="3014262"/>
+            <a:ext cx="4983478" cy="0"/>
+          </a:xfrm>
+          <a:prstGeom prst="line">
+            <a:avLst/>
+          </a:prstGeom>
+        </p:spPr>
+        <p:style>
+          <a:lnRef idx="1">
+            <a:schemeClr val="dk1"/>
+          </a:lnRef>
+          <a:fillRef idx="0">
+            <a:schemeClr val="dk1"/>
+          </a:fillRef>
+          <a:effectRef idx="0">
+            <a:schemeClr val="dk1"/>
+          </a:effectRef>
+          <a:fontRef idx="minor">
+            <a:schemeClr val="tx1"/>
+          </a:fontRef>
+        </p:style>
+      </p:cxnSp>
+      <p:cxnSp>
+        <p:nvCxnSpPr>
+          <p:cNvPr id="16" name="Conector reto 15">
+            <a:extLst>
+              <a:ext uri="{FF2B5EF4-FFF2-40B4-BE49-F238E27FC236}">
+                <a16:creationId xmlns:a16="http://schemas.microsoft.com/office/drawing/2014/main" id="{552C30C7-FA88-4074-B16B-9FD5821DC1B3}"/>
+              </a:ext>
+            </a:extLst>
+          </p:cNvPr>
+          <p:cNvCxnSpPr>
+            <a:cxnSpLocks/>
+            <a:stCxn id="10" idx="3"/>
+            <a:endCxn id="11" idx="0"/>
+          </p:cNvCxnSpPr>
+          <p:nvPr/>
+        </p:nvCxnSpPr>
+        <p:spPr>
+          <a:xfrm flipH="1">
+            <a:off x="9356419" y="3452412"/>
+            <a:ext cx="1" cy="614956"/>
+          </a:xfrm>
+          <a:prstGeom prst="line">
+            <a:avLst/>
+          </a:prstGeom>
+        </p:spPr>
+        <p:style>
+          <a:lnRef idx="1">
+            <a:schemeClr val="dk1"/>
+          </a:lnRef>
+          <a:fillRef idx="0">
+            <a:schemeClr val="dk1"/>
+          </a:fillRef>
+          <a:effectRef idx="0">
+            <a:schemeClr val="dk1"/>
+          </a:effectRef>
+          <a:fontRef idx="minor">
+            <a:schemeClr val="tx1"/>
+          </a:fontRef>
+        </p:style>
+      </p:cxnSp>
     </p:spTree>
     <p:extLst>
       <p:ext uri="{BB962C8B-B14F-4D97-AF65-F5344CB8AC3E}">
-        <p14:creationId xmlns:p14="http://schemas.microsoft.com/office/powerpoint/2010/main" val="2873724792"/>
+        <p14:creationId xmlns:p14="http://schemas.microsoft.com/office/powerpoint/2010/main" val="2394006215"/>
       </p:ext>
     </p:extLst>
   </p:cSld>
@@ -3456,45 +4086,323 @@
           <a:chExt cx="0" cy="0"/>
         </a:xfrm>
       </p:grpSpPr>
-      <p:pic>
-        <p:nvPicPr>
-          <p:cNvPr id="5" name="Imagem 4">
-            <a:extLst>
-              <a:ext uri="{FF2B5EF4-FFF2-40B4-BE49-F238E27FC236}">
-                <a16:creationId xmlns:a16="http://schemas.microsoft.com/office/drawing/2014/main" id="{93D125F0-EF1B-4C63-95F3-7F6D66711D16}"/>
-              </a:ext>
-            </a:extLst>
-          </p:cNvPr>
-          <p:cNvPicPr>
-            <a:picLocks noChangeAspect="1"/>
-          </p:cNvPicPr>
+      <p:sp>
+        <p:nvSpPr>
+          <p:cNvPr id="2" name="Título 1">
+            <a:extLst>
+              <a:ext uri="{FF2B5EF4-FFF2-40B4-BE49-F238E27FC236}">
+                <a16:creationId xmlns:a16="http://schemas.microsoft.com/office/drawing/2014/main" id="{D9329562-D0DB-446E-8355-89873C8CEBAF}"/>
+              </a:ext>
+            </a:extLst>
+          </p:cNvPr>
+          <p:cNvSpPr>
+            <a:spLocks noGrp="1"/>
+          </p:cNvSpPr>
+          <p:nvPr>
+            <p:ph type="title"/>
+          </p:nvPr>
+        </p:nvSpPr>
+        <p:spPr/>
+        <p:txBody>
+          <a:bodyPr/>
+          <a:lstStyle/>
+          <a:p>
+            <a:r>
+              <a:rPr lang="pt-BR" dirty="0"/>
+              <a:t>Cenário: Avaliar viagem</a:t>
+            </a:r>
+          </a:p>
+        </p:txBody>
+      </p:sp>
+      <p:sp>
+        <p:nvSpPr>
+          <p:cNvPr id="5" name="Retângulo 4">
+            <a:extLst>
+              <a:ext uri="{FF2B5EF4-FFF2-40B4-BE49-F238E27FC236}">
+                <a16:creationId xmlns:a16="http://schemas.microsoft.com/office/drawing/2014/main" id="{026A3D63-CC7C-446C-B997-4629105EA2DE}"/>
+              </a:ext>
+            </a:extLst>
+          </p:cNvPr>
+          <p:cNvSpPr/>
           <p:nvPr/>
-        </p:nvPicPr>
-        <p:blipFill>
-          <a:blip r:embed="rId2">
-            <a:extLst>
-              <a:ext uri="{28A0092B-C50C-407E-A947-70E740481C1C}">
-                <a14:useLocalDpi xmlns:a14="http://schemas.microsoft.com/office/drawing/2010/main" val="0"/>
-              </a:ext>
-            </a:extLst>
-          </a:blip>
-          <a:srcRect/>
-          <a:stretch/>
-        </p:blipFill>
+        </p:nvSpPr>
         <p:spPr>
           <a:xfrm>
-            <a:off x="1297354" y="1266387"/>
-            <a:ext cx="8787744" cy="4678450"/>
+            <a:off x="582433" y="2441768"/>
+            <a:ext cx="2488759" cy="1144988"/>
           </a:xfrm>
           <a:prstGeom prst="rect">
             <a:avLst/>
           </a:prstGeom>
         </p:spPr>
-      </p:pic>
+        <p:style>
+          <a:lnRef idx="2">
+            <a:schemeClr val="accent1">
+              <a:shade val="50000"/>
+            </a:schemeClr>
+          </a:lnRef>
+          <a:fillRef idx="1">
+            <a:schemeClr val="accent1"/>
+          </a:fillRef>
+          <a:effectRef idx="0">
+            <a:schemeClr val="accent1"/>
+          </a:effectRef>
+          <a:fontRef idx="minor">
+            <a:schemeClr val="lt1"/>
+          </a:fontRef>
+        </p:style>
+        <p:txBody>
+          <a:bodyPr rtlCol="0" anchor="ctr"/>
+          <a:lstStyle/>
+          <a:p>
+            <a:pPr algn="ctr"/>
+            <a:r>
+              <a:rPr lang="pt-BR" dirty="0"/>
+              <a:t>Cliente (Turista)</a:t>
+            </a:r>
+          </a:p>
+        </p:txBody>
+      </p:sp>
+      <p:sp>
+        <p:nvSpPr>
+          <p:cNvPr id="6" name="Retângulo: Cantos Arredondados 5">
+            <a:extLst>
+              <a:ext uri="{FF2B5EF4-FFF2-40B4-BE49-F238E27FC236}">
+                <a16:creationId xmlns:a16="http://schemas.microsoft.com/office/drawing/2014/main" id="{AAB2747B-D53A-4C31-B074-F5EB85D56539}"/>
+              </a:ext>
+            </a:extLst>
+          </p:cNvPr>
+          <p:cNvSpPr/>
+          <p:nvPr/>
+        </p:nvSpPr>
+        <p:spPr>
+          <a:xfrm>
+            <a:off x="7249324" y="1855912"/>
+            <a:ext cx="4214191" cy="3975652"/>
+          </a:xfrm>
+          <a:prstGeom prst="roundRect">
+            <a:avLst/>
+          </a:prstGeom>
+          <a:noFill/>
+          <a:ln>
+            <a:solidFill>
+              <a:schemeClr val="tx1"/>
+            </a:solidFill>
+          </a:ln>
+        </p:spPr>
+        <p:style>
+          <a:lnRef idx="2">
+            <a:schemeClr val="accent1">
+              <a:shade val="50000"/>
+            </a:schemeClr>
+          </a:lnRef>
+          <a:fillRef idx="1">
+            <a:schemeClr val="accent1"/>
+          </a:fillRef>
+          <a:effectRef idx="0">
+            <a:schemeClr val="accent1"/>
+          </a:effectRef>
+          <a:fontRef idx="minor">
+            <a:schemeClr val="lt1"/>
+          </a:fontRef>
+        </p:style>
+        <p:txBody>
+          <a:bodyPr rtlCol="0" anchor="ctr"/>
+          <a:lstStyle/>
+          <a:p>
+            <a:pPr algn="ctr"/>
+            <a:endParaRPr lang="pt-BR"/>
+          </a:p>
+        </p:txBody>
+      </p:sp>
+      <p:sp>
+        <p:nvSpPr>
+          <p:cNvPr id="10" name="Cubo 9">
+            <a:extLst>
+              <a:ext uri="{FF2B5EF4-FFF2-40B4-BE49-F238E27FC236}">
+                <a16:creationId xmlns:a16="http://schemas.microsoft.com/office/drawing/2014/main" id="{CAE478A0-8075-4F7D-8580-FEF862A42DD5}"/>
+              </a:ext>
+            </a:extLst>
+          </p:cNvPr>
+          <p:cNvSpPr/>
+          <p:nvPr/>
+        </p:nvSpPr>
+        <p:spPr>
+          <a:xfrm>
+            <a:off x="8054670" y="2284012"/>
+            <a:ext cx="2895600" cy="1168400"/>
+          </a:xfrm>
+          <a:prstGeom prst="cube">
+            <a:avLst/>
+          </a:prstGeom>
+        </p:spPr>
+        <p:style>
+          <a:lnRef idx="2">
+            <a:schemeClr val="accent4">
+              <a:shade val="50000"/>
+            </a:schemeClr>
+          </a:lnRef>
+          <a:fillRef idx="1">
+            <a:schemeClr val="accent4"/>
+          </a:fillRef>
+          <a:effectRef idx="0">
+            <a:schemeClr val="accent4"/>
+          </a:effectRef>
+          <a:fontRef idx="minor">
+            <a:schemeClr val="lt1"/>
+          </a:fontRef>
+        </p:style>
+        <p:txBody>
+          <a:bodyPr rtlCol="0" anchor="ctr"/>
+          <a:lstStyle/>
+          <a:p>
+            <a:pPr algn="ctr"/>
+            <a:r>
+              <a:rPr lang="pt-BR" dirty="0"/>
+              <a:t>Desempenho </a:t>
+            </a:r>
+          </a:p>
+          <a:p>
+            <a:pPr algn="ctr"/>
+            <a:r>
+              <a:rPr lang="pt-BR" dirty="0"/>
+              <a:t>(Nó Operacional)</a:t>
+            </a:r>
+          </a:p>
+        </p:txBody>
+      </p:sp>
+      <p:sp>
+        <p:nvSpPr>
+          <p:cNvPr id="11" name="Retângulo 10">
+            <a:extLst>
+              <a:ext uri="{FF2B5EF4-FFF2-40B4-BE49-F238E27FC236}">
+                <a16:creationId xmlns:a16="http://schemas.microsoft.com/office/drawing/2014/main" id="{0556F066-5EF1-4D1B-98B6-00923C81CCF6}"/>
+              </a:ext>
+            </a:extLst>
+          </p:cNvPr>
+          <p:cNvSpPr/>
+          <p:nvPr/>
+        </p:nvSpPr>
+        <p:spPr>
+          <a:xfrm>
+            <a:off x="8112039" y="4067368"/>
+            <a:ext cx="2488759" cy="1144988"/>
+          </a:xfrm>
+          <a:prstGeom prst="rect">
+            <a:avLst/>
+          </a:prstGeom>
+        </p:spPr>
+        <p:style>
+          <a:lnRef idx="2">
+            <a:schemeClr val="accent6">
+              <a:shade val="50000"/>
+            </a:schemeClr>
+          </a:lnRef>
+          <a:fillRef idx="1">
+            <a:schemeClr val="accent6"/>
+          </a:fillRef>
+          <a:effectRef idx="0">
+            <a:schemeClr val="accent6"/>
+          </a:effectRef>
+          <a:fontRef idx="minor">
+            <a:schemeClr val="lt1"/>
+          </a:fontRef>
+        </p:style>
+        <p:txBody>
+          <a:bodyPr rtlCol="0" anchor="ctr"/>
+          <a:lstStyle/>
+          <a:p>
+            <a:pPr algn="ctr"/>
+            <a:r>
+              <a:rPr lang="pt-BR" dirty="0"/>
+              <a:t>Receber e armazenar a avaliação do cliente</a:t>
+            </a:r>
+          </a:p>
+        </p:txBody>
+      </p:sp>
+      <p:cxnSp>
+        <p:nvCxnSpPr>
+          <p:cNvPr id="13" name="Conector reto 12">
+            <a:extLst>
+              <a:ext uri="{FF2B5EF4-FFF2-40B4-BE49-F238E27FC236}">
+                <a16:creationId xmlns:a16="http://schemas.microsoft.com/office/drawing/2014/main" id="{CCDD4109-CD45-4B84-9607-8A21E8232B20}"/>
+              </a:ext>
+            </a:extLst>
+          </p:cNvPr>
+          <p:cNvCxnSpPr>
+            <a:stCxn id="5" idx="3"/>
+            <a:endCxn id="10" idx="2"/>
+          </p:cNvCxnSpPr>
+          <p:nvPr/>
+        </p:nvCxnSpPr>
+        <p:spPr>
+          <a:xfrm>
+            <a:off x="3071192" y="3014262"/>
+            <a:ext cx="4983478" cy="0"/>
+          </a:xfrm>
+          <a:prstGeom prst="line">
+            <a:avLst/>
+          </a:prstGeom>
+        </p:spPr>
+        <p:style>
+          <a:lnRef idx="1">
+            <a:schemeClr val="dk1"/>
+          </a:lnRef>
+          <a:fillRef idx="0">
+            <a:schemeClr val="dk1"/>
+          </a:fillRef>
+          <a:effectRef idx="0">
+            <a:schemeClr val="dk1"/>
+          </a:effectRef>
+          <a:fontRef idx="minor">
+            <a:schemeClr val="tx1"/>
+          </a:fontRef>
+        </p:style>
+      </p:cxnSp>
+      <p:cxnSp>
+        <p:nvCxnSpPr>
+          <p:cNvPr id="16" name="Conector reto 15">
+            <a:extLst>
+              <a:ext uri="{FF2B5EF4-FFF2-40B4-BE49-F238E27FC236}">
+                <a16:creationId xmlns:a16="http://schemas.microsoft.com/office/drawing/2014/main" id="{552C30C7-FA88-4074-B16B-9FD5821DC1B3}"/>
+              </a:ext>
+            </a:extLst>
+          </p:cNvPr>
+          <p:cNvCxnSpPr>
+            <a:cxnSpLocks/>
+            <a:stCxn id="10" idx="3"/>
+            <a:endCxn id="11" idx="0"/>
+          </p:cNvCxnSpPr>
+          <p:nvPr/>
+        </p:nvCxnSpPr>
+        <p:spPr>
+          <a:xfrm flipH="1">
+            <a:off x="9356419" y="3452412"/>
+            <a:ext cx="1" cy="614956"/>
+          </a:xfrm>
+          <a:prstGeom prst="line">
+            <a:avLst/>
+          </a:prstGeom>
+        </p:spPr>
+        <p:style>
+          <a:lnRef idx="1">
+            <a:schemeClr val="dk1"/>
+          </a:lnRef>
+          <a:fillRef idx="0">
+            <a:schemeClr val="dk1"/>
+          </a:fillRef>
+          <a:effectRef idx="0">
+            <a:schemeClr val="dk1"/>
+          </a:effectRef>
+          <a:fontRef idx="minor">
+            <a:schemeClr val="tx1"/>
+          </a:fontRef>
+        </p:style>
+      </p:cxnSp>
     </p:spTree>
     <p:extLst>
       <p:ext uri="{BB962C8B-B14F-4D97-AF65-F5344CB8AC3E}">
-        <p14:creationId xmlns:p14="http://schemas.microsoft.com/office/powerpoint/2010/main" val="3400738764"/>
+        <p14:creationId xmlns:p14="http://schemas.microsoft.com/office/powerpoint/2010/main" val="3554518877"/>
       </p:ext>
     </p:extLst>
   </p:cSld>
@@ -3521,45 +4429,323 @@
           <a:chExt cx="0" cy="0"/>
         </a:xfrm>
       </p:grpSpPr>
-      <p:pic>
-        <p:nvPicPr>
-          <p:cNvPr id="5" name="Imagem 4">
-            <a:extLst>
-              <a:ext uri="{FF2B5EF4-FFF2-40B4-BE49-F238E27FC236}">
-                <a16:creationId xmlns:a16="http://schemas.microsoft.com/office/drawing/2014/main" id="{93D125F0-EF1B-4C63-95F3-7F6D66711D16}"/>
-              </a:ext>
-            </a:extLst>
-          </p:cNvPr>
-          <p:cNvPicPr>
-            <a:picLocks noChangeAspect="1"/>
-          </p:cNvPicPr>
+      <p:sp>
+        <p:nvSpPr>
+          <p:cNvPr id="2" name="Título 1">
+            <a:extLst>
+              <a:ext uri="{FF2B5EF4-FFF2-40B4-BE49-F238E27FC236}">
+                <a16:creationId xmlns:a16="http://schemas.microsoft.com/office/drawing/2014/main" id="{D9329562-D0DB-446E-8355-89873C8CEBAF}"/>
+              </a:ext>
+            </a:extLst>
+          </p:cNvPr>
+          <p:cNvSpPr>
+            <a:spLocks noGrp="1"/>
+          </p:cNvSpPr>
+          <p:nvPr>
+            <p:ph type="title"/>
+          </p:nvPr>
+        </p:nvSpPr>
+        <p:spPr/>
+        <p:txBody>
+          <a:bodyPr/>
+          <a:lstStyle/>
+          <a:p>
+            <a:r>
+              <a:rPr lang="pt-BR" dirty="0"/>
+              <a:t>Cenário: Cancelar viagem</a:t>
+            </a:r>
+          </a:p>
+        </p:txBody>
+      </p:sp>
+      <p:sp>
+        <p:nvSpPr>
+          <p:cNvPr id="5" name="Retângulo 4">
+            <a:extLst>
+              <a:ext uri="{FF2B5EF4-FFF2-40B4-BE49-F238E27FC236}">
+                <a16:creationId xmlns:a16="http://schemas.microsoft.com/office/drawing/2014/main" id="{026A3D63-CC7C-446C-B997-4629105EA2DE}"/>
+              </a:ext>
+            </a:extLst>
+          </p:cNvPr>
+          <p:cNvSpPr/>
           <p:nvPr/>
-        </p:nvPicPr>
-        <p:blipFill>
-          <a:blip r:embed="rId2">
-            <a:extLst>
-              <a:ext uri="{28A0092B-C50C-407E-A947-70E740481C1C}">
-                <a14:useLocalDpi xmlns:a14="http://schemas.microsoft.com/office/drawing/2010/main" val="0"/>
-              </a:ext>
-            </a:extLst>
-          </a:blip>
-          <a:srcRect/>
-          <a:stretch/>
-        </p:blipFill>
+        </p:nvSpPr>
         <p:spPr>
           <a:xfrm>
-            <a:off x="1297354" y="1519805"/>
-            <a:ext cx="8787744" cy="4171613"/>
+            <a:off x="582433" y="2441768"/>
+            <a:ext cx="2488759" cy="1144988"/>
           </a:xfrm>
           <a:prstGeom prst="rect">
             <a:avLst/>
           </a:prstGeom>
         </p:spPr>
-      </p:pic>
+        <p:style>
+          <a:lnRef idx="2">
+            <a:schemeClr val="accent1">
+              <a:shade val="50000"/>
+            </a:schemeClr>
+          </a:lnRef>
+          <a:fillRef idx="1">
+            <a:schemeClr val="accent1"/>
+          </a:fillRef>
+          <a:effectRef idx="0">
+            <a:schemeClr val="accent1"/>
+          </a:effectRef>
+          <a:fontRef idx="minor">
+            <a:schemeClr val="lt1"/>
+          </a:fontRef>
+        </p:style>
+        <p:txBody>
+          <a:bodyPr rtlCol="0" anchor="ctr"/>
+          <a:lstStyle/>
+          <a:p>
+            <a:pPr algn="ctr"/>
+            <a:r>
+              <a:rPr lang="pt-BR" dirty="0"/>
+              <a:t>Cliente (Turista)</a:t>
+            </a:r>
+          </a:p>
+        </p:txBody>
+      </p:sp>
+      <p:sp>
+        <p:nvSpPr>
+          <p:cNvPr id="6" name="Retângulo: Cantos Arredondados 5">
+            <a:extLst>
+              <a:ext uri="{FF2B5EF4-FFF2-40B4-BE49-F238E27FC236}">
+                <a16:creationId xmlns:a16="http://schemas.microsoft.com/office/drawing/2014/main" id="{AAB2747B-D53A-4C31-B074-F5EB85D56539}"/>
+              </a:ext>
+            </a:extLst>
+          </p:cNvPr>
+          <p:cNvSpPr/>
+          <p:nvPr/>
+        </p:nvSpPr>
+        <p:spPr>
+          <a:xfrm>
+            <a:off x="7249324" y="1855912"/>
+            <a:ext cx="4214191" cy="3975652"/>
+          </a:xfrm>
+          <a:prstGeom prst="roundRect">
+            <a:avLst/>
+          </a:prstGeom>
+          <a:noFill/>
+          <a:ln>
+            <a:solidFill>
+              <a:schemeClr val="tx1"/>
+            </a:solidFill>
+          </a:ln>
+        </p:spPr>
+        <p:style>
+          <a:lnRef idx="2">
+            <a:schemeClr val="accent1">
+              <a:shade val="50000"/>
+            </a:schemeClr>
+          </a:lnRef>
+          <a:fillRef idx="1">
+            <a:schemeClr val="accent1"/>
+          </a:fillRef>
+          <a:effectRef idx="0">
+            <a:schemeClr val="accent1"/>
+          </a:effectRef>
+          <a:fontRef idx="minor">
+            <a:schemeClr val="lt1"/>
+          </a:fontRef>
+        </p:style>
+        <p:txBody>
+          <a:bodyPr rtlCol="0" anchor="ctr"/>
+          <a:lstStyle/>
+          <a:p>
+            <a:pPr algn="ctr"/>
+            <a:endParaRPr lang="pt-BR"/>
+          </a:p>
+        </p:txBody>
+      </p:sp>
+      <p:sp>
+        <p:nvSpPr>
+          <p:cNvPr id="10" name="Cubo 9">
+            <a:extLst>
+              <a:ext uri="{FF2B5EF4-FFF2-40B4-BE49-F238E27FC236}">
+                <a16:creationId xmlns:a16="http://schemas.microsoft.com/office/drawing/2014/main" id="{CAE478A0-8075-4F7D-8580-FEF862A42DD5}"/>
+              </a:ext>
+            </a:extLst>
+          </p:cNvPr>
+          <p:cNvSpPr/>
+          <p:nvPr/>
+        </p:nvSpPr>
+        <p:spPr>
+          <a:xfrm>
+            <a:off x="8054670" y="2284012"/>
+            <a:ext cx="2895600" cy="1168400"/>
+          </a:xfrm>
+          <a:prstGeom prst="cube">
+            <a:avLst/>
+          </a:prstGeom>
+        </p:spPr>
+        <p:style>
+          <a:lnRef idx="2">
+            <a:schemeClr val="accent4">
+              <a:shade val="50000"/>
+            </a:schemeClr>
+          </a:lnRef>
+          <a:fillRef idx="1">
+            <a:schemeClr val="accent4"/>
+          </a:fillRef>
+          <a:effectRef idx="0">
+            <a:schemeClr val="accent4"/>
+          </a:effectRef>
+          <a:fontRef idx="minor">
+            <a:schemeClr val="lt1"/>
+          </a:fontRef>
+        </p:style>
+        <p:txBody>
+          <a:bodyPr rtlCol="0" anchor="ctr"/>
+          <a:lstStyle/>
+          <a:p>
+            <a:pPr algn="ctr"/>
+            <a:r>
+              <a:rPr lang="pt-BR" dirty="0"/>
+              <a:t>Administrativo</a:t>
+            </a:r>
+          </a:p>
+          <a:p>
+            <a:pPr algn="ctr"/>
+            <a:r>
+              <a:rPr lang="pt-BR" dirty="0"/>
+              <a:t>(Nó Operacional)</a:t>
+            </a:r>
+          </a:p>
+        </p:txBody>
+      </p:sp>
+      <p:sp>
+        <p:nvSpPr>
+          <p:cNvPr id="11" name="Retângulo 10">
+            <a:extLst>
+              <a:ext uri="{FF2B5EF4-FFF2-40B4-BE49-F238E27FC236}">
+                <a16:creationId xmlns:a16="http://schemas.microsoft.com/office/drawing/2014/main" id="{0556F066-5EF1-4D1B-98B6-00923C81CCF6}"/>
+              </a:ext>
+            </a:extLst>
+          </p:cNvPr>
+          <p:cNvSpPr/>
+          <p:nvPr/>
+        </p:nvSpPr>
+        <p:spPr>
+          <a:xfrm>
+            <a:off x="8112039" y="4067368"/>
+            <a:ext cx="2488759" cy="1144988"/>
+          </a:xfrm>
+          <a:prstGeom prst="rect">
+            <a:avLst/>
+          </a:prstGeom>
+        </p:spPr>
+        <p:style>
+          <a:lnRef idx="2">
+            <a:schemeClr val="accent6">
+              <a:shade val="50000"/>
+            </a:schemeClr>
+          </a:lnRef>
+          <a:fillRef idx="1">
+            <a:schemeClr val="accent6"/>
+          </a:fillRef>
+          <a:effectRef idx="0">
+            <a:schemeClr val="accent6"/>
+          </a:effectRef>
+          <a:fontRef idx="minor">
+            <a:schemeClr val="lt1"/>
+          </a:fontRef>
+        </p:style>
+        <p:txBody>
+          <a:bodyPr rtlCol="0" anchor="ctr"/>
+          <a:lstStyle/>
+          <a:p>
+            <a:pPr algn="ctr"/>
+            <a:r>
+              <a:rPr lang="pt-BR" dirty="0"/>
+              <a:t>Tratar do cancelamento da viagem</a:t>
+            </a:r>
+          </a:p>
+        </p:txBody>
+      </p:sp>
+      <p:cxnSp>
+        <p:nvCxnSpPr>
+          <p:cNvPr id="13" name="Conector reto 12">
+            <a:extLst>
+              <a:ext uri="{FF2B5EF4-FFF2-40B4-BE49-F238E27FC236}">
+                <a16:creationId xmlns:a16="http://schemas.microsoft.com/office/drawing/2014/main" id="{CCDD4109-CD45-4B84-9607-8A21E8232B20}"/>
+              </a:ext>
+            </a:extLst>
+          </p:cNvPr>
+          <p:cNvCxnSpPr>
+            <a:stCxn id="5" idx="3"/>
+            <a:endCxn id="10" idx="2"/>
+          </p:cNvCxnSpPr>
+          <p:nvPr/>
+        </p:nvCxnSpPr>
+        <p:spPr>
+          <a:xfrm>
+            <a:off x="3071192" y="3014262"/>
+            <a:ext cx="4983478" cy="0"/>
+          </a:xfrm>
+          <a:prstGeom prst="line">
+            <a:avLst/>
+          </a:prstGeom>
+        </p:spPr>
+        <p:style>
+          <a:lnRef idx="1">
+            <a:schemeClr val="dk1"/>
+          </a:lnRef>
+          <a:fillRef idx="0">
+            <a:schemeClr val="dk1"/>
+          </a:fillRef>
+          <a:effectRef idx="0">
+            <a:schemeClr val="dk1"/>
+          </a:effectRef>
+          <a:fontRef idx="minor">
+            <a:schemeClr val="tx1"/>
+          </a:fontRef>
+        </p:style>
+      </p:cxnSp>
+      <p:cxnSp>
+        <p:nvCxnSpPr>
+          <p:cNvPr id="16" name="Conector reto 15">
+            <a:extLst>
+              <a:ext uri="{FF2B5EF4-FFF2-40B4-BE49-F238E27FC236}">
+                <a16:creationId xmlns:a16="http://schemas.microsoft.com/office/drawing/2014/main" id="{552C30C7-FA88-4074-B16B-9FD5821DC1B3}"/>
+              </a:ext>
+            </a:extLst>
+          </p:cNvPr>
+          <p:cNvCxnSpPr>
+            <a:cxnSpLocks/>
+            <a:stCxn id="10" idx="3"/>
+            <a:endCxn id="11" idx="0"/>
+          </p:cNvCxnSpPr>
+          <p:nvPr/>
+        </p:nvCxnSpPr>
+        <p:spPr>
+          <a:xfrm flipH="1">
+            <a:off x="9356419" y="3452412"/>
+            <a:ext cx="1" cy="614956"/>
+          </a:xfrm>
+          <a:prstGeom prst="line">
+            <a:avLst/>
+          </a:prstGeom>
+        </p:spPr>
+        <p:style>
+          <a:lnRef idx="1">
+            <a:schemeClr val="dk1"/>
+          </a:lnRef>
+          <a:fillRef idx="0">
+            <a:schemeClr val="dk1"/>
+          </a:fillRef>
+          <a:effectRef idx="0">
+            <a:schemeClr val="dk1"/>
+          </a:effectRef>
+          <a:fontRef idx="minor">
+            <a:schemeClr val="tx1"/>
+          </a:fontRef>
+        </p:style>
+      </p:cxnSp>
     </p:spTree>
     <p:extLst>
       <p:ext uri="{BB962C8B-B14F-4D97-AF65-F5344CB8AC3E}">
-        <p14:creationId xmlns:p14="http://schemas.microsoft.com/office/powerpoint/2010/main" val="4126902142"/>
+        <p14:creationId xmlns:p14="http://schemas.microsoft.com/office/powerpoint/2010/main" val="3609637490"/>
       </p:ext>
     </p:extLst>
   </p:cSld>
@@ -3586,45 +4772,324 @@
           <a:chExt cx="0" cy="0"/>
         </a:xfrm>
       </p:grpSpPr>
-      <p:pic>
-        <p:nvPicPr>
-          <p:cNvPr id="5" name="Imagem 4">
-            <a:extLst>
-              <a:ext uri="{FF2B5EF4-FFF2-40B4-BE49-F238E27FC236}">
-                <a16:creationId xmlns:a16="http://schemas.microsoft.com/office/drawing/2014/main" id="{93D125F0-EF1B-4C63-95F3-7F6D66711D16}"/>
-              </a:ext>
-            </a:extLst>
-          </p:cNvPr>
-          <p:cNvPicPr>
-            <a:picLocks noChangeAspect="1"/>
-          </p:cNvPicPr>
+      <p:sp>
+        <p:nvSpPr>
+          <p:cNvPr id="2" name="Título 1">
+            <a:extLst>
+              <a:ext uri="{FF2B5EF4-FFF2-40B4-BE49-F238E27FC236}">
+                <a16:creationId xmlns:a16="http://schemas.microsoft.com/office/drawing/2014/main" id="{D9329562-D0DB-446E-8355-89873C8CEBAF}"/>
+              </a:ext>
+            </a:extLst>
+          </p:cNvPr>
+          <p:cNvSpPr>
+            <a:spLocks noGrp="1"/>
+          </p:cNvSpPr>
+          <p:nvPr>
+            <p:ph type="title"/>
+          </p:nvPr>
+        </p:nvSpPr>
+        <p:spPr/>
+        <p:txBody>
+          <a:bodyPr/>
+          <a:lstStyle/>
+          <a:p>
+            <a:r>
+              <a:rPr lang="pt-BR" dirty="0"/>
+              <a:t>Cenário: Fornecer serviço de guia</a:t>
+            </a:r>
+          </a:p>
+        </p:txBody>
+      </p:sp>
+      <p:sp>
+        <p:nvSpPr>
+          <p:cNvPr id="6" name="Retângulo: Cantos Arredondados 5">
+            <a:extLst>
+              <a:ext uri="{FF2B5EF4-FFF2-40B4-BE49-F238E27FC236}">
+                <a16:creationId xmlns:a16="http://schemas.microsoft.com/office/drawing/2014/main" id="{AAB2747B-D53A-4C31-B074-F5EB85D56539}"/>
+              </a:ext>
+            </a:extLst>
+          </p:cNvPr>
+          <p:cNvSpPr/>
           <p:nvPr/>
-        </p:nvPicPr>
-        <p:blipFill>
-          <a:blip r:embed="rId2">
-            <a:extLst>
-              <a:ext uri="{28A0092B-C50C-407E-A947-70E740481C1C}">
-                <a14:useLocalDpi xmlns:a14="http://schemas.microsoft.com/office/drawing/2010/main" val="0"/>
-              </a:ext>
-            </a:extLst>
-          </a:blip>
-          <a:srcRect/>
-          <a:stretch/>
-        </p:blipFill>
+        </p:nvSpPr>
         <p:spPr>
           <a:xfrm>
-            <a:off x="1297354" y="1448620"/>
-            <a:ext cx="8787744" cy="4313983"/>
+            <a:off x="7249324" y="1855912"/>
+            <a:ext cx="4214191" cy="3975652"/>
+          </a:xfrm>
+          <a:prstGeom prst="roundRect">
+            <a:avLst/>
+          </a:prstGeom>
+          <a:noFill/>
+          <a:ln>
+            <a:solidFill>
+              <a:schemeClr val="tx1"/>
+            </a:solidFill>
+          </a:ln>
+        </p:spPr>
+        <p:style>
+          <a:lnRef idx="2">
+            <a:schemeClr val="accent1">
+              <a:shade val="50000"/>
+            </a:schemeClr>
+          </a:lnRef>
+          <a:fillRef idx="1">
+            <a:schemeClr val="accent1"/>
+          </a:fillRef>
+          <a:effectRef idx="0">
+            <a:schemeClr val="accent1"/>
+          </a:effectRef>
+          <a:fontRef idx="minor">
+            <a:schemeClr val="lt1"/>
+          </a:fontRef>
+        </p:style>
+        <p:txBody>
+          <a:bodyPr rtlCol="0" anchor="ctr"/>
+          <a:lstStyle/>
+          <a:p>
+            <a:pPr algn="ctr"/>
+            <a:endParaRPr lang="pt-BR"/>
+          </a:p>
+        </p:txBody>
+      </p:sp>
+      <p:sp>
+        <p:nvSpPr>
+          <p:cNvPr id="10" name="Cubo 9">
+            <a:extLst>
+              <a:ext uri="{FF2B5EF4-FFF2-40B4-BE49-F238E27FC236}">
+                <a16:creationId xmlns:a16="http://schemas.microsoft.com/office/drawing/2014/main" id="{CAE478A0-8075-4F7D-8580-FEF862A42DD5}"/>
+              </a:ext>
+            </a:extLst>
+          </p:cNvPr>
+          <p:cNvSpPr/>
+          <p:nvPr/>
+        </p:nvSpPr>
+        <p:spPr>
+          <a:xfrm>
+            <a:off x="8054670" y="2284012"/>
+            <a:ext cx="2895600" cy="1168400"/>
+          </a:xfrm>
+          <a:prstGeom prst="cube">
+            <a:avLst/>
+          </a:prstGeom>
+        </p:spPr>
+        <p:style>
+          <a:lnRef idx="2">
+            <a:schemeClr val="accent4">
+              <a:shade val="50000"/>
+            </a:schemeClr>
+          </a:lnRef>
+          <a:fillRef idx="1">
+            <a:schemeClr val="accent4"/>
+          </a:fillRef>
+          <a:effectRef idx="0">
+            <a:schemeClr val="accent4"/>
+          </a:effectRef>
+          <a:fontRef idx="minor">
+            <a:schemeClr val="lt1"/>
+          </a:fontRef>
+        </p:style>
+        <p:txBody>
+          <a:bodyPr rtlCol="0" anchor="ctr"/>
+          <a:lstStyle/>
+          <a:p>
+            <a:pPr algn="ctr"/>
+            <a:r>
+              <a:rPr lang="pt-BR" dirty="0"/>
+              <a:t>Compras</a:t>
+            </a:r>
+          </a:p>
+          <a:p>
+            <a:pPr algn="ctr"/>
+            <a:r>
+              <a:rPr lang="pt-BR" dirty="0"/>
+              <a:t>(Nó Operacional)</a:t>
+            </a:r>
+          </a:p>
+        </p:txBody>
+      </p:sp>
+      <p:sp>
+        <p:nvSpPr>
+          <p:cNvPr id="11" name="Retângulo 10">
+            <a:extLst>
+              <a:ext uri="{FF2B5EF4-FFF2-40B4-BE49-F238E27FC236}">
+                <a16:creationId xmlns:a16="http://schemas.microsoft.com/office/drawing/2014/main" id="{0556F066-5EF1-4D1B-98B6-00923C81CCF6}"/>
+              </a:ext>
+            </a:extLst>
+          </p:cNvPr>
+          <p:cNvSpPr/>
+          <p:nvPr/>
+        </p:nvSpPr>
+        <p:spPr>
+          <a:xfrm>
+            <a:off x="8112039" y="4067368"/>
+            <a:ext cx="2488759" cy="1144988"/>
           </a:xfrm>
           <a:prstGeom prst="rect">
             <a:avLst/>
           </a:prstGeom>
         </p:spPr>
-      </p:pic>
+        <p:style>
+          <a:lnRef idx="2">
+            <a:schemeClr val="accent6">
+              <a:shade val="50000"/>
+            </a:schemeClr>
+          </a:lnRef>
+          <a:fillRef idx="1">
+            <a:schemeClr val="accent6"/>
+          </a:fillRef>
+          <a:effectRef idx="0">
+            <a:schemeClr val="accent6"/>
+          </a:effectRef>
+          <a:fontRef idx="minor">
+            <a:schemeClr val="lt1"/>
+          </a:fontRef>
+        </p:style>
+        <p:txBody>
+          <a:bodyPr rtlCol="0" anchor="ctr"/>
+          <a:lstStyle/>
+          <a:p>
+            <a:pPr algn="ctr"/>
+            <a:r>
+              <a:rPr lang="pt-BR" dirty="0"/>
+              <a:t>Contratar serviços de guia </a:t>
+            </a:r>
+          </a:p>
+        </p:txBody>
+      </p:sp>
+      <p:cxnSp>
+        <p:nvCxnSpPr>
+          <p:cNvPr id="13" name="Conector reto 12">
+            <a:extLst>
+              <a:ext uri="{FF2B5EF4-FFF2-40B4-BE49-F238E27FC236}">
+                <a16:creationId xmlns:a16="http://schemas.microsoft.com/office/drawing/2014/main" id="{CCDD4109-CD45-4B84-9607-8A21E8232B20}"/>
+              </a:ext>
+            </a:extLst>
+          </p:cNvPr>
+          <p:cNvCxnSpPr>
+            <a:cxnSpLocks/>
+            <a:stCxn id="9" idx="3"/>
+            <a:endCxn id="10" idx="2"/>
+          </p:cNvCxnSpPr>
+          <p:nvPr/>
+        </p:nvCxnSpPr>
+        <p:spPr>
+          <a:xfrm>
+            <a:off x="3071192" y="3014262"/>
+            <a:ext cx="4983478" cy="0"/>
+          </a:xfrm>
+          <a:prstGeom prst="line">
+            <a:avLst/>
+          </a:prstGeom>
+        </p:spPr>
+        <p:style>
+          <a:lnRef idx="1">
+            <a:schemeClr val="dk1"/>
+          </a:lnRef>
+          <a:fillRef idx="0">
+            <a:schemeClr val="dk1"/>
+          </a:fillRef>
+          <a:effectRef idx="0">
+            <a:schemeClr val="dk1"/>
+          </a:effectRef>
+          <a:fontRef idx="minor">
+            <a:schemeClr val="tx1"/>
+          </a:fontRef>
+        </p:style>
+      </p:cxnSp>
+      <p:cxnSp>
+        <p:nvCxnSpPr>
+          <p:cNvPr id="16" name="Conector reto 15">
+            <a:extLst>
+              <a:ext uri="{FF2B5EF4-FFF2-40B4-BE49-F238E27FC236}">
+                <a16:creationId xmlns:a16="http://schemas.microsoft.com/office/drawing/2014/main" id="{552C30C7-FA88-4074-B16B-9FD5821DC1B3}"/>
+              </a:ext>
+            </a:extLst>
+          </p:cNvPr>
+          <p:cNvCxnSpPr>
+            <a:cxnSpLocks/>
+            <a:stCxn id="10" idx="3"/>
+            <a:endCxn id="11" idx="0"/>
+          </p:cNvCxnSpPr>
+          <p:nvPr/>
+        </p:nvCxnSpPr>
+        <p:spPr>
+          <a:xfrm flipH="1">
+            <a:off x="9356419" y="3452412"/>
+            <a:ext cx="1" cy="614956"/>
+          </a:xfrm>
+          <a:prstGeom prst="line">
+            <a:avLst/>
+          </a:prstGeom>
+        </p:spPr>
+        <p:style>
+          <a:lnRef idx="1">
+            <a:schemeClr val="dk1"/>
+          </a:lnRef>
+          <a:fillRef idx="0">
+            <a:schemeClr val="dk1"/>
+          </a:fillRef>
+          <a:effectRef idx="0">
+            <a:schemeClr val="dk1"/>
+          </a:effectRef>
+          <a:fontRef idx="minor">
+            <a:schemeClr val="tx1"/>
+          </a:fontRef>
+        </p:style>
+      </p:cxnSp>
+      <p:sp>
+        <p:nvSpPr>
+          <p:cNvPr id="9" name="Retângulo 8">
+            <a:extLst>
+              <a:ext uri="{FF2B5EF4-FFF2-40B4-BE49-F238E27FC236}">
+                <a16:creationId xmlns:a16="http://schemas.microsoft.com/office/drawing/2014/main" id="{AE1D61C3-FC28-4D01-A759-C3A16FF33985}"/>
+              </a:ext>
+            </a:extLst>
+          </p:cNvPr>
+          <p:cNvSpPr/>
+          <p:nvPr/>
+        </p:nvSpPr>
+        <p:spPr>
+          <a:xfrm>
+            <a:off x="582433" y="2404903"/>
+            <a:ext cx="2488759" cy="1218717"/>
+          </a:xfrm>
+          <a:prstGeom prst="rect">
+            <a:avLst/>
+          </a:prstGeom>
+        </p:spPr>
+        <p:style>
+          <a:lnRef idx="2">
+            <a:schemeClr val="accent2">
+              <a:shade val="50000"/>
+            </a:schemeClr>
+          </a:lnRef>
+          <a:fillRef idx="1">
+            <a:schemeClr val="accent2"/>
+          </a:fillRef>
+          <a:effectRef idx="0">
+            <a:schemeClr val="accent2"/>
+          </a:effectRef>
+          <a:fontRef idx="minor">
+            <a:schemeClr val="lt1"/>
+          </a:fontRef>
+        </p:style>
+        <p:txBody>
+          <a:bodyPr rtlCol="0" anchor="ctr"/>
+          <a:lstStyle/>
+          <a:p>
+            <a:pPr algn="ctr"/>
+            <a:r>
+              <a:rPr lang="pt-BR" dirty="0"/>
+              <a:t>Guia Turístico</a:t>
+            </a:r>
+          </a:p>
+        </p:txBody>
+      </p:sp>
     </p:spTree>
     <p:extLst>
       <p:ext uri="{BB962C8B-B14F-4D97-AF65-F5344CB8AC3E}">
-        <p14:creationId xmlns:p14="http://schemas.microsoft.com/office/powerpoint/2010/main" val="774408315"/>
+        <p14:creationId xmlns:p14="http://schemas.microsoft.com/office/powerpoint/2010/main" val="1131464978"/>
       </p:ext>
     </p:extLst>
   </p:cSld>

</xml_diff>

<commit_message>
Manutencao no Art. 15
</commit_message>
<xml_diff>
--- a/15. Arquitetura de Negócio Para Cada Cenário.pptx
+++ b/15. Arquitetura de Negócio Para Cada Cenário.pptx
@@ -280,7 +280,7 @@
           <a:p>
             <a:fld id="{1A3BC42B-6901-4EDA-813C-5D3930327F95}" type="datetimeFigureOut">
               <a:rPr lang="pt-BR" smtClean="0"/>
-              <a:t>18/03/2021</a:t>
+              <a:t>19/03/2021</a:t>
             </a:fld>
             <a:endParaRPr lang="pt-BR"/>
           </a:p>
@@ -478,7 +478,7 @@
           <a:p>
             <a:fld id="{1A3BC42B-6901-4EDA-813C-5D3930327F95}" type="datetimeFigureOut">
               <a:rPr lang="pt-BR" smtClean="0"/>
-              <a:t>18/03/2021</a:t>
+              <a:t>19/03/2021</a:t>
             </a:fld>
             <a:endParaRPr lang="pt-BR"/>
           </a:p>
@@ -686,7 +686,7 @@
           <a:p>
             <a:fld id="{1A3BC42B-6901-4EDA-813C-5D3930327F95}" type="datetimeFigureOut">
               <a:rPr lang="pt-BR" smtClean="0"/>
-              <a:t>18/03/2021</a:t>
+              <a:t>19/03/2021</a:t>
             </a:fld>
             <a:endParaRPr lang="pt-BR"/>
           </a:p>
@@ -884,7 +884,7 @@
           <a:p>
             <a:fld id="{1A3BC42B-6901-4EDA-813C-5D3930327F95}" type="datetimeFigureOut">
               <a:rPr lang="pt-BR" smtClean="0"/>
-              <a:t>18/03/2021</a:t>
+              <a:t>19/03/2021</a:t>
             </a:fld>
             <a:endParaRPr lang="pt-BR"/>
           </a:p>
@@ -1159,7 +1159,7 @@
           <a:p>
             <a:fld id="{1A3BC42B-6901-4EDA-813C-5D3930327F95}" type="datetimeFigureOut">
               <a:rPr lang="pt-BR" smtClean="0"/>
-              <a:t>18/03/2021</a:t>
+              <a:t>19/03/2021</a:t>
             </a:fld>
             <a:endParaRPr lang="pt-BR"/>
           </a:p>
@@ -1424,7 +1424,7 @@
           <a:p>
             <a:fld id="{1A3BC42B-6901-4EDA-813C-5D3930327F95}" type="datetimeFigureOut">
               <a:rPr lang="pt-BR" smtClean="0"/>
-              <a:t>18/03/2021</a:t>
+              <a:t>19/03/2021</a:t>
             </a:fld>
             <a:endParaRPr lang="pt-BR"/>
           </a:p>
@@ -1836,7 +1836,7 @@
           <a:p>
             <a:fld id="{1A3BC42B-6901-4EDA-813C-5D3930327F95}" type="datetimeFigureOut">
               <a:rPr lang="pt-BR" smtClean="0"/>
-              <a:t>18/03/2021</a:t>
+              <a:t>19/03/2021</a:t>
             </a:fld>
             <a:endParaRPr lang="pt-BR"/>
           </a:p>
@@ -1977,7 +1977,7 @@
           <a:p>
             <a:fld id="{1A3BC42B-6901-4EDA-813C-5D3930327F95}" type="datetimeFigureOut">
               <a:rPr lang="pt-BR" smtClean="0"/>
-              <a:t>18/03/2021</a:t>
+              <a:t>19/03/2021</a:t>
             </a:fld>
             <a:endParaRPr lang="pt-BR"/>
           </a:p>
@@ -2090,7 +2090,7 @@
           <a:p>
             <a:fld id="{1A3BC42B-6901-4EDA-813C-5D3930327F95}" type="datetimeFigureOut">
               <a:rPr lang="pt-BR" smtClean="0"/>
-              <a:t>18/03/2021</a:t>
+              <a:t>19/03/2021</a:t>
             </a:fld>
             <a:endParaRPr lang="pt-BR"/>
           </a:p>
@@ -2401,7 +2401,7 @@
           <a:p>
             <a:fld id="{1A3BC42B-6901-4EDA-813C-5D3930327F95}" type="datetimeFigureOut">
               <a:rPr lang="pt-BR" smtClean="0"/>
-              <a:t>18/03/2021</a:t>
+              <a:t>19/03/2021</a:t>
             </a:fld>
             <a:endParaRPr lang="pt-BR"/>
           </a:p>
@@ -2689,7 +2689,7 @@
           <a:p>
             <a:fld id="{1A3BC42B-6901-4EDA-813C-5D3930327F95}" type="datetimeFigureOut">
               <a:rPr lang="pt-BR" smtClean="0"/>
-              <a:t>18/03/2021</a:t>
+              <a:t>19/03/2021</a:t>
             </a:fld>
             <a:endParaRPr lang="pt-BR"/>
           </a:p>
@@ -2930,7 +2930,7 @@
           <a:p>
             <a:fld id="{1A3BC42B-6901-4EDA-813C-5D3930327F95}" type="datetimeFigureOut">
               <a:rPr lang="pt-BR" smtClean="0"/>
-              <a:t>18/03/2021</a:t>
+              <a:t>19/03/2021</a:t>
             </a:fld>
             <a:endParaRPr lang="pt-BR"/>
           </a:p>
@@ -3925,7 +3925,7 @@
             <a:pPr algn="ctr"/>
             <a:r>
               <a:rPr lang="pt-BR" dirty="0"/>
-              <a:t>Tratar da venda da viagem</a:t>
+              <a:t>Tratar da venda da Excursão</a:t>
             </a:r>
           </a:p>
         </p:txBody>
@@ -4268,7 +4268,7 @@
             <a:pPr algn="ctr"/>
             <a:r>
               <a:rPr lang="pt-BR" dirty="0"/>
-              <a:t>Tratar do cancelamento da viagem</a:t>
+              <a:t>Tratar do cancelamento da Excursão</a:t>
             </a:r>
           </a:p>
         </p:txBody>
@@ -4619,7 +4619,7 @@
             <a:pPr algn="ctr"/>
             <a:r>
               <a:rPr lang="pt-BR" dirty="0"/>
-              <a:t>Informar detalhes sobre a viagem</a:t>
+              <a:t>Informar detalhes sobre a Excursão</a:t>
             </a:r>
           </a:p>
         </p:txBody>
@@ -5305,7 +5305,7 @@
             <a:pPr algn="ctr"/>
             <a:r>
               <a:rPr lang="pt-BR" dirty="0"/>
-              <a:t>Informar detalhes sobre a viagem</a:t>
+              <a:t>Informar detalhes sobre a Excursão</a:t>
             </a:r>
           </a:p>
         </p:txBody>

</xml_diff>